<commit_message>
scala currying and local type reference
</commit_message>
<xml_diff>
--- a/Scala.pptx
+++ b/Scala.pptx
@@ -15,26 +15,27 @@
     <p:sldId id="276" r:id="rId9"/>
     <p:sldId id="295" r:id="rId10"/>
     <p:sldId id="296" r:id="rId11"/>
-    <p:sldId id="272" r:id="rId12"/>
-    <p:sldId id="289" r:id="rId13"/>
-    <p:sldId id="290" r:id="rId14"/>
-    <p:sldId id="288" r:id="rId15"/>
-    <p:sldId id="273" r:id="rId16"/>
-    <p:sldId id="285" r:id="rId17"/>
-    <p:sldId id="286" r:id="rId18"/>
-    <p:sldId id="287" r:id="rId19"/>
-    <p:sldId id="274" r:id="rId20"/>
-    <p:sldId id="281" r:id="rId21"/>
-    <p:sldId id="275" r:id="rId22"/>
-    <p:sldId id="283" r:id="rId23"/>
-    <p:sldId id="277" r:id="rId24"/>
-    <p:sldId id="278" r:id="rId25"/>
-    <p:sldId id="279" r:id="rId26"/>
-    <p:sldId id="280" r:id="rId27"/>
-    <p:sldId id="282" r:id="rId28"/>
-    <p:sldId id="284" r:id="rId29"/>
-    <p:sldId id="269" r:id="rId30"/>
-    <p:sldId id="294" r:id="rId31"/>
+    <p:sldId id="297" r:id="rId12"/>
+    <p:sldId id="272" r:id="rId13"/>
+    <p:sldId id="289" r:id="rId14"/>
+    <p:sldId id="290" r:id="rId15"/>
+    <p:sldId id="288" r:id="rId16"/>
+    <p:sldId id="273" r:id="rId17"/>
+    <p:sldId id="285" r:id="rId18"/>
+    <p:sldId id="286" r:id="rId19"/>
+    <p:sldId id="287" r:id="rId20"/>
+    <p:sldId id="274" r:id="rId21"/>
+    <p:sldId id="281" r:id="rId22"/>
+    <p:sldId id="275" r:id="rId23"/>
+    <p:sldId id="283" r:id="rId24"/>
+    <p:sldId id="277" r:id="rId25"/>
+    <p:sldId id="278" r:id="rId26"/>
+    <p:sldId id="279" r:id="rId27"/>
+    <p:sldId id="280" r:id="rId28"/>
+    <p:sldId id="282" r:id="rId29"/>
+    <p:sldId id="284" r:id="rId30"/>
+    <p:sldId id="269" r:id="rId31"/>
+    <p:sldId id="294" r:id="rId32"/>
   </p:sldIdLst>
   <p:sldSz cx="9144000" cy="6858000" type="screen4x3"/>
   <p:notesSz cx="6858000" cy="9144000"/>
@@ -324,7 +325,7 @@
           <a:p>
             <a:fld id="{8F235549-BF0A-4B98-8561-3786244E808C}" type="datetimeFigureOut">
               <a:rPr lang="en-US" smtClean="0"/>
-              <a:t>4/28/2017</a:t>
+              <a:t>5/30/2017</a:t>
             </a:fld>
             <a:endParaRPr lang="en-US"/>
           </a:p>
@@ -524,7 +525,7 @@
           <a:p>
             <a:fld id="{8F235549-BF0A-4B98-8561-3786244E808C}" type="datetimeFigureOut">
               <a:rPr lang="en-US" smtClean="0"/>
-              <a:t>4/28/2017</a:t>
+              <a:t>5/30/2017</a:t>
             </a:fld>
             <a:endParaRPr lang="en-US"/>
           </a:p>
@@ -699,7 +700,7 @@
           <a:p>
             <a:fld id="{8F235549-BF0A-4B98-8561-3786244E808C}" type="datetimeFigureOut">
               <a:rPr lang="en-US" smtClean="0"/>
-              <a:t>4/28/2017</a:t>
+              <a:t>5/30/2017</a:t>
             </a:fld>
             <a:endParaRPr lang="en-US"/>
           </a:p>
@@ -864,7 +865,7 @@
           <a:p>
             <a:fld id="{8F235549-BF0A-4B98-8561-3786244E808C}" type="datetimeFigureOut">
               <a:rPr lang="en-US" smtClean="0"/>
-              <a:t>4/28/2017</a:t>
+              <a:t>5/30/2017</a:t>
             </a:fld>
             <a:endParaRPr lang="en-US"/>
           </a:p>
@@ -1112,7 +1113,7 @@
           <a:p>
             <a:fld id="{8F235549-BF0A-4B98-8561-3786244E808C}" type="datetimeFigureOut">
               <a:rPr lang="en-US" smtClean="0"/>
-              <a:t>4/28/2017</a:t>
+              <a:t>5/30/2017</a:t>
             </a:fld>
             <a:endParaRPr lang="en-US"/>
           </a:p>
@@ -1430,7 +1431,7 @@
           <a:p>
             <a:fld id="{8F235549-BF0A-4B98-8561-3786244E808C}" type="datetimeFigureOut">
               <a:rPr lang="en-US" smtClean="0"/>
-              <a:t>4/28/2017</a:t>
+              <a:t>5/30/2017</a:t>
             </a:fld>
             <a:endParaRPr lang="en-US"/>
           </a:p>
@@ -1896,7 +1897,7 @@
           <a:p>
             <a:fld id="{8F235549-BF0A-4B98-8561-3786244E808C}" type="datetimeFigureOut">
               <a:rPr lang="en-US" smtClean="0"/>
-              <a:t>4/28/2017</a:t>
+              <a:t>5/30/2017</a:t>
             </a:fld>
             <a:endParaRPr lang="en-US"/>
           </a:p>
@@ -2044,7 +2045,7 @@
           <a:p>
             <a:fld id="{8F235549-BF0A-4B98-8561-3786244E808C}" type="datetimeFigureOut">
               <a:rPr lang="en-US" smtClean="0"/>
-              <a:t>4/28/2017</a:t>
+              <a:t>5/30/2017</a:t>
             </a:fld>
             <a:endParaRPr lang="en-US"/>
           </a:p>
@@ -2134,7 +2135,7 @@
           <a:p>
             <a:fld id="{8F235549-BF0A-4B98-8561-3786244E808C}" type="datetimeFigureOut">
               <a:rPr lang="en-US" smtClean="0"/>
-              <a:t>4/28/2017</a:t>
+              <a:t>5/30/2017</a:t>
             </a:fld>
             <a:endParaRPr lang="en-US"/>
           </a:p>
@@ -2408,7 +2409,7 @@
           <a:p>
             <a:fld id="{8F235549-BF0A-4B98-8561-3786244E808C}" type="datetimeFigureOut">
               <a:rPr lang="en-US" smtClean="0"/>
-              <a:t>4/28/2017</a:t>
+              <a:t>5/30/2017</a:t>
             </a:fld>
             <a:endParaRPr lang="en-US"/>
           </a:p>
@@ -2713,7 +2714,7 @@
           <a:p>
             <a:fld id="{8F235549-BF0A-4B98-8561-3786244E808C}" type="datetimeFigureOut">
               <a:rPr lang="en-US" smtClean="0"/>
-              <a:t>4/28/2017</a:t>
+              <a:t>5/30/2017</a:t>
             </a:fld>
             <a:endParaRPr lang="en-US"/>
           </a:p>
@@ -3011,7 +3012,7 @@
           <a:p>
             <a:fld id="{8F235549-BF0A-4B98-8561-3786244E808C}" type="datetimeFigureOut">
               <a:rPr lang="en-US" smtClean="0"/>
-              <a:t>4/28/2017</a:t>
+              <a:t>5/30/2017</a:t>
             </a:fld>
             <a:endParaRPr lang="en-US"/>
           </a:p>
@@ -3485,11 +3486,7 @@
           <a:p>
             <a:r>
               <a:rPr lang="en-US" dirty="0" smtClean="0"/>
-              <a:t>Scala – </a:t>
-            </a:r>
-            <a:r>
-              <a:rPr lang="en-US" dirty="0" smtClean="0"/>
-              <a:t>Case Class</a:t>
+              <a:t>Scala – Case Class</a:t>
             </a:r>
             <a:endParaRPr lang="en-US" dirty="0"/>
           </a:p>
@@ -3513,20 +3510,36 @@
           <a:lstStyle/>
           <a:p>
             <a:r>
+              <a:rPr lang="en-GB" sz="1600" b="1" dirty="0" smtClean="0"/>
+              <a:t>Immutable</a:t>
+            </a:r>
+            <a:r>
               <a:rPr lang="en-GB" sz="1600" dirty="0" smtClean="0"/>
-              <a:t>Immutable by default</a:t>
+              <a:t> by default</a:t>
             </a:r>
           </a:p>
           <a:p>
             <a:r>
               <a:rPr lang="en-GB" sz="1600" dirty="0" smtClean="0"/>
-              <a:t>Decomposable through pattern matching</a:t>
-            </a:r>
-          </a:p>
-          <a:p>
-            <a:r>
-              <a:rPr lang="en-GB" sz="1600" dirty="0"/>
-              <a:t>Compared by structural equality instead of by </a:t>
+              <a:t>Decomposable through </a:t>
+            </a:r>
+            <a:r>
+              <a:rPr lang="en-GB" sz="1600" b="1" dirty="0" smtClean="0"/>
+              <a:t>pattern matching</a:t>
+            </a:r>
+          </a:p>
+          <a:p>
+            <a:r>
+              <a:rPr lang="en-GB" sz="1600" dirty="0"/>
+              <a:t>Compared by </a:t>
+            </a:r>
+            <a:r>
+              <a:rPr lang="en-GB" sz="1600" b="1" dirty="0"/>
+              <a:t>structural equality</a:t>
+            </a:r>
+            <a:r>
+              <a:rPr lang="en-GB" sz="1600" dirty="0"/>
+              <a:t> instead of by </a:t>
             </a:r>
             <a:r>
               <a:rPr lang="en-GB" sz="1600" dirty="0" smtClean="0"/>
@@ -3595,14 +3608,16 @@
         </p:nvSpPr>
         <p:spPr/>
         <p:txBody>
-          <a:bodyPr>
-            <a:normAutofit fontScale="90000"/>
-          </a:bodyPr>
+          <a:bodyPr/>
           <a:lstStyle/>
           <a:p>
             <a:r>
               <a:rPr lang="en-US" dirty="0" smtClean="0"/>
-              <a:t>Scala – Distributed Computing Frameworks</a:t>
+              <a:t>Scala – </a:t>
+            </a:r>
+            <a:r>
+              <a:rPr lang="en-US" dirty="0" smtClean="0"/>
+              <a:t>Currying</a:t>
             </a:r>
             <a:endParaRPr lang="en-US" dirty="0"/>
           </a:p>
@@ -3627,33 +3642,145 @@
           <a:p>
             <a:r>
               <a:rPr lang="en-GB" sz="1600" dirty="0"/>
-              <a:t>Play web </a:t>
+              <a:t>Currying is the technique of </a:t>
+            </a:r>
+            <a:r>
+              <a:rPr lang="en-GB" sz="1600" b="1" dirty="0"/>
+              <a:t>transforming</a:t>
+            </a:r>
+            <a:r>
+              <a:rPr lang="en-GB" sz="1600" dirty="0"/>
+              <a:t> a function that takes </a:t>
+            </a:r>
+            <a:r>
+              <a:rPr lang="en-GB" sz="1600" b="1" dirty="0"/>
+              <a:t>multiple arguments </a:t>
+            </a:r>
+            <a:r>
+              <a:rPr lang="en-GB" sz="1600" dirty="0"/>
+              <a:t>into a function that takes a </a:t>
+            </a:r>
+            <a:r>
+              <a:rPr lang="en-GB" sz="1600" b="1" dirty="0"/>
+              <a:t>single argument</a:t>
+            </a:r>
+            <a:r>
+              <a:rPr lang="en-GB" sz="1600" dirty="0"/>
+              <a:t> </a:t>
+            </a:r>
+            <a:endParaRPr lang="en-GB" sz="1600" dirty="0" smtClean="0"/>
+          </a:p>
+          <a:p>
+            <a:r>
+              <a:rPr lang="en-GB" sz="1600" dirty="0"/>
+              <a:t>Methods may define multiple parameter lists. When a method is called with a fewer number of parameter lists, then this will yield a function taking the missing parameter lists as its </a:t>
             </a:r>
             <a:r>
               <a:rPr lang="en-GB" sz="1600" dirty="0" smtClean="0"/>
-              <a:t>framework - </a:t>
-            </a:r>
-            <a:r>
-              <a:rPr lang="en-GB" sz="1600" dirty="0"/>
-              <a:t>Play framework supports both Java and Scala and that could prove to be a valuable </a:t>
-            </a:r>
-            <a:r>
-              <a:rPr lang="en-GB" sz="1600" dirty="0" smtClean="0"/>
-              <a:t>advantage </a:t>
-            </a:r>
-          </a:p>
-          <a:p>
-            <a:r>
-              <a:rPr lang="en-GB" sz="1600" dirty="0" smtClean="0"/>
-              <a:t>Apache Spark</a:t>
-            </a:r>
-          </a:p>
-        </p:txBody>
-      </p:sp>
+              <a:t>arguments</a:t>
+            </a:r>
+          </a:p>
+          <a:p>
+            <a:r>
+              <a:rPr lang="en-GB" sz="1600" b="1" dirty="0" smtClean="0"/>
+              <a:t>Output:-</a:t>
+            </a:r>
+          </a:p>
+          <a:p>
+            <a:pPr>
+              <a:buFont typeface="Wingdings" panose="05000000000000000000" pitchFamily="2" charset="2"/>
+              <a:buChar char="Ø"/>
+            </a:pPr>
+            <a:r>
+              <a:rPr lang="en-GB" sz="1600" dirty="0"/>
+              <a:t>List(2,4,6,8)</a:t>
+            </a:r>
+          </a:p>
+          <a:p>
+            <a:pPr>
+              <a:buFont typeface="Wingdings" panose="05000000000000000000" pitchFamily="2" charset="2"/>
+              <a:buChar char="Ø"/>
+            </a:pPr>
+            <a:r>
+              <a:rPr lang="en-GB" sz="1600" dirty="0"/>
+              <a:t>List(3,6)</a:t>
+            </a:r>
+          </a:p>
+          <a:p>
+            <a:endParaRPr lang="en-GB" sz="1600" dirty="0" smtClean="0"/>
+          </a:p>
+          <a:p>
+            <a:pPr marL="0" indent="0">
+              <a:buNone/>
+            </a:pPr>
+            <a:endParaRPr lang="en-GB" sz="1600" dirty="0" smtClean="0"/>
+          </a:p>
+          <a:p>
+            <a:pPr marL="0" indent="0">
+              <a:buNone/>
+            </a:pPr>
+            <a:endParaRPr lang="en-GB" sz="1600" dirty="0"/>
+          </a:p>
+        </p:txBody>
+      </p:sp>
+      <p:pic>
+        <p:nvPicPr>
+          <p:cNvPr id="1026" name="Picture 2"/>
+          <p:cNvPicPr>
+            <a:picLocks noChangeAspect="1" noChangeArrowheads="1"/>
+          </p:cNvPicPr>
+          <p:nvPr/>
+        </p:nvPicPr>
+        <p:blipFill>
+          <a:blip r:embed="rId2">
+            <a:extLst>
+              <a:ext uri="{28A0092B-C50C-407E-A947-70E740481C1C}">
+                <a14:useLocalDpi xmlns:a14="http://schemas.microsoft.com/office/drawing/2010/main" val="0"/>
+              </a:ext>
+            </a:extLst>
+          </a:blip>
+          <a:srcRect/>
+          <a:stretch>
+            <a:fillRect/>
+          </a:stretch>
+        </p:blipFill>
+        <p:spPr bwMode="auto">
+          <a:xfrm>
+            <a:off x="2843808" y="3212976"/>
+            <a:ext cx="4457700" cy="2705100"/>
+          </a:xfrm>
+          <a:prstGeom prst="rect">
+            <a:avLst/>
+          </a:prstGeom>
+          <a:noFill/>
+          <a:ln>
+            <a:noFill/>
+          </a:ln>
+          <a:extLst>
+            <a:ext uri="{909E8E84-426E-40DD-AFC4-6F175D3DCCD1}">
+              <a14:hiddenFill xmlns:a14="http://schemas.microsoft.com/office/drawing/2010/main">
+                <a:solidFill>
+                  <a:schemeClr val="accent1"/>
+                </a:solidFill>
+              </a14:hiddenFill>
+            </a:ext>
+            <a:ext uri="{91240B29-F687-4F45-9708-019B960494DF}">
+              <a14:hiddenLine xmlns:a14="http://schemas.microsoft.com/office/drawing/2010/main" w="9525">
+                <a:solidFill>
+                  <a:schemeClr val="tx1"/>
+                </a:solidFill>
+                <a:miter lim="800000"/>
+                <a:headEnd/>
+                <a:tailEnd/>
+              </a14:hiddenLine>
+            </a:ext>
+          </a:extLst>
+        </p:spPr>
+      </p:pic>
     </p:spTree>
     <p:extLst>
       <p:ext uri="{BB962C8B-B14F-4D97-AF65-F5344CB8AC3E}">
-        <p14:creationId xmlns:p14="http://schemas.microsoft.com/office/powerpoint/2010/main" val="1828697207"/>
+        <p14:creationId xmlns:p14="http://schemas.microsoft.com/office/powerpoint/2010/main" val="1937952446"/>
       </p:ext>
     </p:extLst>
   </p:cSld>
@@ -3700,6 +3827,110 @@
         <p:spPr/>
         <p:txBody>
           <a:bodyPr>
+            <a:normAutofit fontScale="90000"/>
+          </a:bodyPr>
+          <a:lstStyle/>
+          <a:p>
+            <a:r>
+              <a:rPr lang="en-US" dirty="0" smtClean="0"/>
+              <a:t>Scala – Distributed Computing Frameworks</a:t>
+            </a:r>
+            <a:endParaRPr lang="en-US" dirty="0"/>
+          </a:p>
+        </p:txBody>
+      </p:sp>
+      <p:sp>
+        <p:nvSpPr>
+          <p:cNvPr id="3" name="Content Placeholder 2"/>
+          <p:cNvSpPr>
+            <a:spLocks noGrp="1"/>
+          </p:cNvSpPr>
+          <p:nvPr>
+            <p:ph idx="1"/>
+          </p:nvPr>
+        </p:nvSpPr>
+        <p:spPr/>
+        <p:txBody>
+          <a:bodyPr>
+            <a:normAutofit/>
+          </a:bodyPr>
+          <a:lstStyle/>
+          <a:p>
+            <a:r>
+              <a:rPr lang="en-GB" sz="1600" dirty="0"/>
+              <a:t>Play web </a:t>
+            </a:r>
+            <a:r>
+              <a:rPr lang="en-GB" sz="1600" dirty="0" smtClean="0"/>
+              <a:t>framework - </a:t>
+            </a:r>
+            <a:r>
+              <a:rPr lang="en-GB" sz="1600" dirty="0"/>
+              <a:t>Play framework supports both Java and Scala and that could prove to be a valuable </a:t>
+            </a:r>
+            <a:r>
+              <a:rPr lang="en-GB" sz="1600" dirty="0" smtClean="0"/>
+              <a:t>advantage </a:t>
+            </a:r>
+          </a:p>
+          <a:p>
+            <a:r>
+              <a:rPr lang="en-GB" sz="1600" dirty="0" smtClean="0"/>
+              <a:t>Apache Spark</a:t>
+            </a:r>
+          </a:p>
+        </p:txBody>
+      </p:sp>
+    </p:spTree>
+    <p:extLst>
+      <p:ext uri="{BB962C8B-B14F-4D97-AF65-F5344CB8AC3E}">
+        <p14:creationId xmlns:p14="http://schemas.microsoft.com/office/powerpoint/2010/main" val="1828697207"/>
+      </p:ext>
+    </p:extLst>
+  </p:cSld>
+  <p:clrMapOvr>
+    <a:masterClrMapping/>
+  </p:clrMapOvr>
+  <p:timing>
+    <p:tnLst>
+      <p:par>
+        <p:cTn id="1" dur="indefinite" restart="never" nodeType="tmRoot"/>
+      </p:par>
+    </p:tnLst>
+  </p:timing>
+</p:sld>
+</file>
+
+<file path=ppt/slides/slide13.xml><?xml version="1.0" encoding="utf-8"?>
+<p:sld xmlns:a="http://schemas.openxmlformats.org/drawingml/2006/main" xmlns:r="http://schemas.openxmlformats.org/officeDocument/2006/relationships" xmlns:p="http://schemas.openxmlformats.org/presentationml/2006/main">
+  <p:cSld>
+    <p:spTree>
+      <p:nvGrpSpPr>
+        <p:cNvPr id="1" name=""/>
+        <p:cNvGrpSpPr/>
+        <p:nvPr/>
+      </p:nvGrpSpPr>
+      <p:grpSpPr>
+        <a:xfrm>
+          <a:off x="0" y="0"/>
+          <a:ext cx="0" cy="0"/>
+          <a:chOff x="0" y="0"/>
+          <a:chExt cx="0" cy="0"/>
+        </a:xfrm>
+      </p:grpSpPr>
+      <p:sp>
+        <p:nvSpPr>
+          <p:cNvPr id="2" name="Title 1"/>
+          <p:cNvSpPr>
+            <a:spLocks noGrp="1"/>
+          </p:cNvSpPr>
+          <p:nvPr>
+            <p:ph type="title"/>
+          </p:nvPr>
+        </p:nvSpPr>
+        <p:spPr/>
+        <p:txBody>
+          <a:bodyPr>
             <a:normAutofit/>
           </a:bodyPr>
           <a:lstStyle/>
@@ -3779,7 +4010,7 @@
 </p:sld>
 </file>
 
-<file path=ppt/slides/slide13.xml><?xml version="1.0" encoding="utf-8"?>
+<file path=ppt/slides/slide14.xml><?xml version="1.0" encoding="utf-8"?>
 <p:sld xmlns:a="http://schemas.openxmlformats.org/drawingml/2006/main" xmlns:r="http://schemas.openxmlformats.org/officeDocument/2006/relationships" xmlns:p="http://schemas.openxmlformats.org/presentationml/2006/main">
   <p:cSld>
     <p:spTree>
@@ -3897,7 +4128,7 @@
 </p:sld>
 </file>
 
-<file path=ppt/slides/slide14.xml><?xml version="1.0" encoding="utf-8"?>
+<file path=ppt/slides/slide15.xml><?xml version="1.0" encoding="utf-8"?>
 <p:sld xmlns:a="http://schemas.openxmlformats.org/drawingml/2006/main" xmlns:r="http://schemas.openxmlformats.org/officeDocument/2006/relationships" xmlns:p="http://schemas.openxmlformats.org/presentationml/2006/main">
   <p:cSld>
     <p:spTree>
@@ -4013,7 +4244,7 @@
 </p:sld>
 </file>
 
-<file path=ppt/slides/slide15.xml><?xml version="1.0" encoding="utf-8"?>
+<file path=ppt/slides/slide16.xml><?xml version="1.0" encoding="utf-8"?>
 <p:sld xmlns:a="http://schemas.openxmlformats.org/drawingml/2006/main" xmlns:r="http://schemas.openxmlformats.org/officeDocument/2006/relationships" xmlns:p="http://schemas.openxmlformats.org/presentationml/2006/main">
   <p:cSld>
     <p:spTree>
@@ -4766,367 +4997,6 @@
 </p:sld>
 </file>
 
-<file path=ppt/slides/slide16.xml><?xml version="1.0" encoding="utf-8"?>
-<p:sld xmlns:a="http://schemas.openxmlformats.org/drawingml/2006/main" xmlns:r="http://schemas.openxmlformats.org/officeDocument/2006/relationships" xmlns:p="http://schemas.openxmlformats.org/presentationml/2006/main">
-  <p:cSld>
-    <p:spTree>
-      <p:nvGrpSpPr>
-        <p:cNvPr id="1" name=""/>
-        <p:cNvGrpSpPr/>
-        <p:nvPr/>
-      </p:nvGrpSpPr>
-      <p:grpSpPr>
-        <a:xfrm>
-          <a:off x="0" y="0"/>
-          <a:ext cx="0" cy="0"/>
-          <a:chOff x="0" y="0"/>
-          <a:chExt cx="0" cy="0"/>
-        </a:xfrm>
-      </p:grpSpPr>
-      <p:sp>
-        <p:nvSpPr>
-          <p:cNvPr id="2" name="Title 1"/>
-          <p:cNvSpPr>
-            <a:spLocks noGrp="1"/>
-          </p:cNvSpPr>
-          <p:nvPr>
-            <p:ph type="title"/>
-          </p:nvPr>
-        </p:nvSpPr>
-        <p:spPr/>
-        <p:txBody>
-          <a:bodyPr>
-            <a:normAutofit/>
-          </a:bodyPr>
-          <a:lstStyle/>
-          <a:p>
-            <a:r>
-              <a:rPr lang="en-US" dirty="0" smtClean="0"/>
-              <a:t>Apache Spark</a:t>
-            </a:r>
-            <a:endParaRPr lang="en-US" dirty="0"/>
-          </a:p>
-        </p:txBody>
-      </p:sp>
-      <p:sp>
-        <p:nvSpPr>
-          <p:cNvPr id="3" name="Content Placeholder 2"/>
-          <p:cNvSpPr>
-            <a:spLocks noGrp="1"/>
-          </p:cNvSpPr>
-          <p:nvPr>
-            <p:ph idx="1"/>
-          </p:nvPr>
-        </p:nvSpPr>
-        <p:spPr/>
-        <p:txBody>
-          <a:bodyPr>
-            <a:normAutofit/>
-          </a:bodyPr>
-          <a:lstStyle/>
-          <a:p>
-            <a:r>
-              <a:rPr lang="en-GB" sz="1600" dirty="0" smtClean="0"/>
-              <a:t>Apache Spark</a:t>
-            </a:r>
-          </a:p>
-          <a:p>
-            <a:pPr lvl="1">
-              <a:buFont typeface="Wingdings" panose="05000000000000000000" pitchFamily="2" charset="2"/>
-              <a:buChar char="Ø"/>
-            </a:pPr>
-            <a:r>
-              <a:rPr lang="en-GB" sz="1400" dirty="0" smtClean="0"/>
-              <a:t>Fast and general engine for large scale data processing</a:t>
-            </a:r>
-          </a:p>
-          <a:p>
-            <a:pPr lvl="1">
-              <a:buFont typeface="Wingdings" panose="05000000000000000000" pitchFamily="2" charset="2"/>
-              <a:buChar char="Ø"/>
-            </a:pPr>
-            <a:r>
-              <a:rPr lang="en-GB" sz="1400" dirty="0" smtClean="0"/>
-              <a:t>Runs program up to 100x faster than Hadoop MapReduce in memory or 10x faster on disk</a:t>
-            </a:r>
-          </a:p>
-          <a:p>
-            <a:pPr lvl="1">
-              <a:buFont typeface="Wingdings" panose="05000000000000000000" pitchFamily="2" charset="2"/>
-              <a:buChar char="Ø"/>
-            </a:pPr>
-            <a:r>
-              <a:rPr lang="en-GB" sz="1400" dirty="0" smtClean="0"/>
-              <a:t>Ease of use – Write applications quickly in Java, Scala, Python, R</a:t>
-            </a:r>
-          </a:p>
-          <a:p>
-            <a:pPr lvl="1">
-              <a:buFont typeface="Wingdings" panose="05000000000000000000" pitchFamily="2" charset="2"/>
-              <a:buChar char="Ø"/>
-            </a:pPr>
-            <a:r>
-              <a:rPr lang="en-GB" sz="1400" dirty="0" smtClean="0"/>
-              <a:t>Generality – Combine SQL, streaming, and complex analytics</a:t>
-            </a:r>
-          </a:p>
-          <a:p>
-            <a:pPr lvl="1">
-              <a:buFont typeface="Wingdings" panose="05000000000000000000" pitchFamily="2" charset="2"/>
-              <a:buChar char="Ø"/>
-            </a:pPr>
-            <a:r>
-              <a:rPr lang="en-GB" sz="1400" dirty="0"/>
-              <a:t>Spark powers a stack of libraries including </a:t>
-            </a:r>
-            <a:r>
-              <a:rPr lang="en-GB" sz="1400" dirty="0">
-                <a:hlinkClick r:id="rId2"/>
-              </a:rPr>
-              <a:t>SQL and DataFrames</a:t>
-            </a:r>
-            <a:r>
-              <a:rPr lang="en-GB" sz="1400" dirty="0"/>
-              <a:t>, </a:t>
-            </a:r>
-            <a:r>
-              <a:rPr lang="en-GB" sz="1400" dirty="0">
-                <a:hlinkClick r:id="rId3"/>
-              </a:rPr>
-              <a:t>MLlib</a:t>
-            </a:r>
-            <a:r>
-              <a:rPr lang="en-GB" sz="1400" dirty="0"/>
-              <a:t> for machine learning, </a:t>
-            </a:r>
-            <a:r>
-              <a:rPr lang="en-GB" sz="1400" dirty="0">
-                <a:hlinkClick r:id="rId4"/>
-              </a:rPr>
-              <a:t>GraphX</a:t>
-            </a:r>
-            <a:r>
-              <a:rPr lang="en-GB" sz="1400" dirty="0"/>
-              <a:t>, and </a:t>
-            </a:r>
-            <a:r>
-              <a:rPr lang="en-GB" sz="1400" u="sng" dirty="0">
-                <a:hlinkClick r:id="rId5"/>
-              </a:rPr>
-              <a:t>Spark </a:t>
-            </a:r>
-            <a:r>
-              <a:rPr lang="en-GB" sz="1400" u="sng" dirty="0" smtClean="0">
-                <a:hlinkClick r:id="rId5"/>
-              </a:rPr>
-              <a:t>Streaming</a:t>
-            </a:r>
-            <a:endParaRPr lang="en-GB" sz="1400" u="sng" dirty="0" smtClean="0"/>
-          </a:p>
-          <a:p>
-            <a:pPr lvl="1">
-              <a:buFont typeface="Wingdings" panose="05000000000000000000" pitchFamily="2" charset="2"/>
-              <a:buChar char="Ø"/>
-            </a:pPr>
-            <a:r>
-              <a:rPr lang="en-GB" sz="1400" dirty="0"/>
-              <a:t>Spark runs on Hadoop, Mesos, standalone, or in the cloud. It can access diverse data sources including HDFS, Cassandra, HBase, and </a:t>
-            </a:r>
-            <a:r>
-              <a:rPr lang="en-GB" sz="1400" dirty="0" smtClean="0"/>
-              <a:t>S3</a:t>
-            </a:r>
-          </a:p>
-          <a:p>
-            <a:pPr lvl="1">
-              <a:buFont typeface="Wingdings" panose="05000000000000000000" pitchFamily="2" charset="2"/>
-              <a:buChar char="Ø"/>
-            </a:pPr>
-            <a:r>
-              <a:rPr lang="en-GB" sz="1400" dirty="0"/>
-              <a:t>Spark provides programmers with an </a:t>
-            </a:r>
-            <a:r>
-              <a:rPr lang="en-GB" sz="1400" dirty="0">
-                <a:hlinkClick r:id="rId6" tooltip="Application programming interface"/>
-              </a:rPr>
-              <a:t>application programming interface</a:t>
-            </a:r>
-            <a:r>
-              <a:rPr lang="en-GB" sz="1400" dirty="0"/>
-              <a:t> centered on a </a:t>
-            </a:r>
-            <a:r>
-              <a:rPr lang="en-GB" sz="1400" dirty="0">
-                <a:hlinkClick r:id="rId7" tooltip="Data structure"/>
-              </a:rPr>
-              <a:t>data structure</a:t>
-            </a:r>
-            <a:r>
-              <a:rPr lang="en-GB" sz="1400" dirty="0"/>
-              <a:t> called the </a:t>
-            </a:r>
-            <a:r>
-              <a:rPr lang="en-GB" sz="1400" b="1" dirty="0">
-                <a:solidFill>
-                  <a:srgbClr val="00B050"/>
-                </a:solidFill>
-              </a:rPr>
-              <a:t>resilient distributed dataset </a:t>
-            </a:r>
-            <a:r>
-              <a:rPr lang="en-GB" sz="1400" dirty="0"/>
-              <a:t>(RDD), a read-only </a:t>
-            </a:r>
-            <a:r>
-              <a:rPr lang="en-GB" sz="1400" dirty="0">
-                <a:hlinkClick r:id="rId8" tooltip="Multiset"/>
-              </a:rPr>
-              <a:t>multiset</a:t>
-            </a:r>
-            <a:r>
-              <a:rPr lang="en-GB" sz="1400" dirty="0"/>
-              <a:t> of data items distributed over a cluster of machines, that is maintained in a </a:t>
-            </a:r>
-            <a:r>
-              <a:rPr lang="en-GB" sz="1400" dirty="0">
-                <a:hlinkClick r:id="rId9" tooltip="Fault-tolerant computing"/>
-              </a:rPr>
-              <a:t>fault-tolerant</a:t>
-            </a:r>
-            <a:r>
-              <a:rPr lang="en-GB" sz="1400" dirty="0"/>
-              <a:t> </a:t>
-            </a:r>
-            <a:r>
-              <a:rPr lang="en-GB" sz="1400" dirty="0" smtClean="0"/>
-              <a:t>way</a:t>
-            </a:r>
-          </a:p>
-          <a:p>
-            <a:pPr lvl="1">
-              <a:buFont typeface="Wingdings" panose="05000000000000000000" pitchFamily="2" charset="2"/>
-              <a:buChar char="Ø"/>
-            </a:pPr>
-            <a:r>
-              <a:rPr lang="en-GB" sz="1400" dirty="0"/>
-              <a:t>The availability of RDDs facilitates the implementation of both </a:t>
-            </a:r>
-            <a:r>
-              <a:rPr lang="en-GB" sz="1400" dirty="0">
-                <a:hlinkClick r:id="rId10" tooltip="Iterative algorithm"/>
-              </a:rPr>
-              <a:t>iterative algorithms</a:t>
-            </a:r>
-            <a:r>
-              <a:rPr lang="en-GB" sz="1400" dirty="0"/>
-              <a:t>, that visit their dataset multiple times in a loop, and interactive/exploratory data analysis, i.e., the repeated </a:t>
-            </a:r>
-            <a:r>
-              <a:rPr lang="en-GB" sz="1400" dirty="0">
-                <a:hlinkClick r:id="rId11" tooltip="Database"/>
-              </a:rPr>
-              <a:t>database</a:t>
-            </a:r>
-            <a:r>
-              <a:rPr lang="en-GB" sz="1400" dirty="0"/>
-              <a:t>-style querying of </a:t>
-            </a:r>
-            <a:r>
-              <a:rPr lang="en-GB" sz="1400" dirty="0" smtClean="0"/>
-              <a:t>data</a:t>
-            </a:r>
-          </a:p>
-          <a:p>
-            <a:pPr lvl="1">
-              <a:buFont typeface="Wingdings" panose="05000000000000000000" pitchFamily="2" charset="2"/>
-              <a:buChar char="Ø"/>
-            </a:pPr>
-            <a:r>
-              <a:rPr lang="en-GB" sz="1400" dirty="0"/>
-              <a:t>Spark also supports a </a:t>
-            </a:r>
-            <a:r>
-              <a:rPr lang="en-GB" sz="1400" b="1" dirty="0"/>
-              <a:t>pseudo-distributed local mode</a:t>
-            </a:r>
-            <a:r>
-              <a:rPr lang="en-GB" sz="1400" dirty="0"/>
-              <a:t>, usually used only for development or testing purposes, where distributed storage is not required and the local file system can be used instead; in such a scenario, Spark is run on a single machine with one executor per </a:t>
-            </a:r>
-            <a:r>
-              <a:rPr lang="en-GB" sz="1400" dirty="0">
-                <a:hlinkClick r:id="rId12" tooltip="CPU core"/>
-              </a:rPr>
-              <a:t>CPU </a:t>
-            </a:r>
-            <a:r>
-              <a:rPr lang="en-GB" sz="1400" dirty="0" smtClean="0">
-                <a:hlinkClick r:id="rId12" tooltip="CPU core"/>
-              </a:rPr>
-              <a:t>core</a:t>
-            </a:r>
-            <a:endParaRPr lang="en-GB" sz="1400" dirty="0" smtClean="0"/>
-          </a:p>
-          <a:p>
-            <a:pPr lvl="1">
-              <a:buFont typeface="Wingdings" panose="05000000000000000000" pitchFamily="2" charset="2"/>
-              <a:buChar char="Ø"/>
-            </a:pPr>
-            <a:r>
-              <a:rPr lang="en-GB" sz="1400" dirty="0" smtClean="0"/>
-              <a:t>RDD is </a:t>
-            </a:r>
-            <a:r>
-              <a:rPr lang="en-GB" sz="1400" b="1" dirty="0" smtClean="0">
-                <a:solidFill>
-                  <a:srgbClr val="00B050"/>
-                </a:solidFill>
-              </a:rPr>
-              <a:t>immutable</a:t>
-            </a:r>
-            <a:r>
-              <a:rPr lang="en-GB" sz="1400" dirty="0" smtClean="0"/>
-              <a:t> and their operations are </a:t>
-            </a:r>
-            <a:r>
-              <a:rPr lang="en-GB" sz="1400" b="1" dirty="0" smtClean="0">
-                <a:solidFill>
-                  <a:srgbClr val="00B050"/>
-                </a:solidFill>
-              </a:rPr>
-              <a:t>lazy</a:t>
-            </a:r>
-          </a:p>
-          <a:p>
-            <a:pPr lvl="1">
-              <a:buFont typeface="Wingdings" panose="05000000000000000000" pitchFamily="2" charset="2"/>
-              <a:buChar char="Ø"/>
-            </a:pPr>
-            <a:endParaRPr lang="en-GB" sz="1400" dirty="0"/>
-          </a:p>
-        </p:txBody>
-      </p:sp>
-    </p:spTree>
-    <p:extLst>
-      <p:ext uri="{BB962C8B-B14F-4D97-AF65-F5344CB8AC3E}">
-        <p14:creationId xmlns:p14="http://schemas.microsoft.com/office/powerpoint/2010/main" val="2583158910"/>
-      </p:ext>
-    </p:extLst>
-  </p:cSld>
-  <p:clrMapOvr>
-    <a:masterClrMapping/>
-  </p:clrMapOvr>
-  <p:timing>
-    <p:tnLst>
-      <p:par>
-        <p:cTn id="1" dur="indefinite" restart="never" nodeType="tmRoot"/>
-      </p:par>
-    </p:tnLst>
-  </p:timing>
-</p:sld>
-</file>
-
 <file path=ppt/slides/slide17.xml><?xml version="1.0" encoding="utf-8"?>
 <p:sld xmlns:a="http://schemas.openxmlformats.org/drawingml/2006/main" xmlns:r="http://schemas.openxmlformats.org/officeDocument/2006/relationships" xmlns:p="http://schemas.openxmlformats.org/presentationml/2006/main">
   <p:cSld>
@@ -5163,7 +5033,7 @@
           <a:p>
             <a:r>
               <a:rPr lang="en-US" dirty="0" smtClean="0"/>
-              <a:t>Apache Spark – Advantages</a:t>
+              <a:t>Apache Spark</a:t>
             </a:r>
             <a:endParaRPr lang="en-US" dirty="0"/>
           </a:p>
@@ -5187,91 +5057,291 @@
           <a:lstStyle/>
           <a:p>
             <a:r>
-              <a:rPr lang="en-GB" sz="1600" b="1" dirty="0" smtClean="0"/>
-              <a:t>In-memory data storage </a:t>
-            </a:r>
-            <a:r>
               <a:rPr lang="en-GB" sz="1600" dirty="0" smtClean="0"/>
-              <a:t>and near real-time processing. So, it performs several times faster than other big data technologies</a:t>
-            </a:r>
-          </a:p>
-          <a:p>
-            <a:r>
-              <a:rPr lang="en-GB" sz="1600" dirty="0"/>
-              <a:t>Spark also supports </a:t>
-            </a:r>
-            <a:r>
-              <a:rPr lang="en-GB" sz="1600" b="1" dirty="0"/>
-              <a:t>lazy evaluation </a:t>
-            </a:r>
-            <a:r>
-              <a:rPr lang="en-GB" sz="1600" dirty="0"/>
-              <a:t>of big data queries, which helps with optimization of the steps in data processing </a:t>
-            </a:r>
-            <a:r>
-              <a:rPr lang="en-GB" sz="1600" dirty="0" smtClean="0"/>
-              <a:t>workflows</a:t>
-            </a:r>
-          </a:p>
-          <a:p>
-            <a:r>
-              <a:rPr lang="en-GB" sz="1600" dirty="0" smtClean="0"/>
-              <a:t>API improves </a:t>
-            </a:r>
-            <a:r>
-              <a:rPr lang="en-GB" sz="1600" b="1" dirty="0" smtClean="0"/>
-              <a:t>developer productivity</a:t>
-            </a:r>
-            <a:r>
-              <a:rPr lang="en-GB" sz="1600" dirty="0" smtClean="0"/>
-              <a:t> </a:t>
-            </a:r>
-          </a:p>
-          <a:p>
-            <a:r>
-              <a:rPr lang="en-GB" sz="1600" dirty="0"/>
-              <a:t>It’s designed to be an execution engine that works both in-memory and on-disk</a:t>
-            </a:r>
-            <a:endParaRPr lang="en-GB" sz="1600" dirty="0" smtClean="0"/>
-          </a:p>
-          <a:p>
-            <a:r>
-              <a:rPr lang="en-GB" sz="1600" dirty="0"/>
-              <a:t>Spark will attempt to store as much as data in memory and then will spill to </a:t>
-            </a:r>
-            <a:r>
-              <a:rPr lang="en-GB" sz="1600" dirty="0" smtClean="0"/>
-              <a:t>disk</a:t>
-            </a:r>
-          </a:p>
-          <a:p>
-            <a:r>
-              <a:rPr lang="en-GB" sz="1600" dirty="0"/>
-              <a:t>Offers </a:t>
-            </a:r>
-            <a:r>
-              <a:rPr lang="en-GB" sz="1600" b="1" dirty="0"/>
-              <a:t>interactive shell</a:t>
-            </a:r>
-            <a:r>
-              <a:rPr lang="en-GB" sz="1600" dirty="0"/>
-              <a:t> for Scala and Python. This is not available in Java yet</a:t>
-            </a:r>
-            <a:endParaRPr lang="en-GB" sz="1600" dirty="0" smtClean="0"/>
+              <a:t>Apache Spark</a:t>
+            </a:r>
           </a:p>
           <a:p>
             <a:pPr lvl="1">
               <a:buFont typeface="Wingdings" panose="05000000000000000000" pitchFamily="2" charset="2"/>
               <a:buChar char="Ø"/>
             </a:pPr>
-            <a:endParaRPr lang="en-GB" sz="1600" dirty="0"/>
+            <a:r>
+              <a:rPr lang="en-GB" sz="1400" dirty="0" smtClean="0"/>
+              <a:t>Fast and general engine for large scale data processing</a:t>
+            </a:r>
+          </a:p>
+          <a:p>
+            <a:pPr lvl="1">
+              <a:buFont typeface="Wingdings" panose="05000000000000000000" pitchFamily="2" charset="2"/>
+              <a:buChar char="Ø"/>
+            </a:pPr>
+            <a:r>
+              <a:rPr lang="en-GB" sz="1400" dirty="0" smtClean="0"/>
+              <a:t>Runs program up to 100x faster than Hadoop MapReduce in memory or 10x faster on disk</a:t>
+            </a:r>
+          </a:p>
+          <a:p>
+            <a:pPr lvl="1">
+              <a:buFont typeface="Wingdings" panose="05000000000000000000" pitchFamily="2" charset="2"/>
+              <a:buChar char="Ø"/>
+            </a:pPr>
+            <a:r>
+              <a:rPr lang="en-GB" sz="1400" dirty="0" smtClean="0"/>
+              <a:t>Ease of use – Write applications quickly in Java, Scala, Python, R</a:t>
+            </a:r>
+          </a:p>
+          <a:p>
+            <a:pPr lvl="1">
+              <a:buFont typeface="Wingdings" panose="05000000000000000000" pitchFamily="2" charset="2"/>
+              <a:buChar char="Ø"/>
+            </a:pPr>
+            <a:r>
+              <a:rPr lang="en-GB" sz="1400" dirty="0" smtClean="0"/>
+              <a:t>Generality – Combine SQL, streaming, and complex analytics</a:t>
+            </a:r>
+          </a:p>
+          <a:p>
+            <a:pPr lvl="1">
+              <a:buFont typeface="Wingdings" panose="05000000000000000000" pitchFamily="2" charset="2"/>
+              <a:buChar char="Ø"/>
+            </a:pPr>
+            <a:r>
+              <a:rPr lang="en-GB" sz="1400" dirty="0"/>
+              <a:t>Spark powers a stack of libraries including </a:t>
+            </a:r>
+            <a:r>
+              <a:rPr lang="en-GB" sz="1400" dirty="0">
+                <a:hlinkClick r:id="rId2"/>
+              </a:rPr>
+              <a:t>SQL and DataFrames</a:t>
+            </a:r>
+            <a:r>
+              <a:rPr lang="en-GB" sz="1400" dirty="0"/>
+              <a:t>, </a:t>
+            </a:r>
+            <a:r>
+              <a:rPr lang="en-GB" sz="1400" dirty="0">
+                <a:hlinkClick r:id="rId3"/>
+              </a:rPr>
+              <a:t>MLlib</a:t>
+            </a:r>
+            <a:r>
+              <a:rPr lang="en-GB" sz="1400" dirty="0"/>
+              <a:t> for machine learning, </a:t>
+            </a:r>
+            <a:r>
+              <a:rPr lang="en-GB" sz="1400" dirty="0">
+                <a:hlinkClick r:id="rId4"/>
+              </a:rPr>
+              <a:t>GraphX</a:t>
+            </a:r>
+            <a:r>
+              <a:rPr lang="en-GB" sz="1400" dirty="0"/>
+              <a:t>, and </a:t>
+            </a:r>
+            <a:r>
+              <a:rPr lang="en-GB" sz="1400" u="sng" dirty="0">
+                <a:hlinkClick r:id="rId5"/>
+              </a:rPr>
+              <a:t>Spark </a:t>
+            </a:r>
+            <a:r>
+              <a:rPr lang="en-GB" sz="1400" u="sng" dirty="0" smtClean="0">
+                <a:hlinkClick r:id="rId5"/>
+              </a:rPr>
+              <a:t>Streaming</a:t>
+            </a:r>
+            <a:endParaRPr lang="en-GB" sz="1400" u="sng" dirty="0" smtClean="0"/>
+          </a:p>
+          <a:p>
+            <a:pPr lvl="1">
+              <a:buFont typeface="Wingdings" panose="05000000000000000000" pitchFamily="2" charset="2"/>
+              <a:buChar char="Ø"/>
+            </a:pPr>
+            <a:r>
+              <a:rPr lang="en-GB" sz="1400" dirty="0"/>
+              <a:t>Spark runs on Hadoop, Mesos, standalone, or in the cloud. It can access diverse data sources including HDFS, Cassandra, HBase, and </a:t>
+            </a:r>
+            <a:r>
+              <a:rPr lang="en-GB" sz="1400" dirty="0" smtClean="0"/>
+              <a:t>S3</a:t>
+            </a:r>
+          </a:p>
+          <a:p>
+            <a:pPr lvl="1">
+              <a:buFont typeface="Wingdings" panose="05000000000000000000" pitchFamily="2" charset="2"/>
+              <a:buChar char="Ø"/>
+            </a:pPr>
+            <a:r>
+              <a:rPr lang="en-GB" sz="1400" dirty="0"/>
+              <a:t>Spark provides programmers with an </a:t>
+            </a:r>
+            <a:r>
+              <a:rPr lang="en-GB" sz="1400" dirty="0">
+                <a:hlinkClick r:id="rId6" tooltip="Application programming interface"/>
+              </a:rPr>
+              <a:t>application programming interface</a:t>
+            </a:r>
+            <a:r>
+              <a:rPr lang="en-GB" sz="1400" dirty="0"/>
+              <a:t> centered on a </a:t>
+            </a:r>
+            <a:r>
+              <a:rPr lang="en-GB" sz="1400" dirty="0">
+                <a:hlinkClick r:id="rId7" tooltip="Data structure"/>
+              </a:rPr>
+              <a:t>data structure</a:t>
+            </a:r>
+            <a:r>
+              <a:rPr lang="en-GB" sz="1400" dirty="0"/>
+              <a:t> called the </a:t>
+            </a:r>
+            <a:r>
+              <a:rPr lang="en-GB" sz="1400" b="1" dirty="0">
+                <a:solidFill>
+                  <a:srgbClr val="00B050"/>
+                </a:solidFill>
+              </a:rPr>
+              <a:t>resilient distributed dataset </a:t>
+            </a:r>
+            <a:r>
+              <a:rPr lang="en-GB" sz="1400" dirty="0"/>
+              <a:t>(RDD), a read-only </a:t>
+            </a:r>
+            <a:r>
+              <a:rPr lang="en-GB" sz="1400" dirty="0">
+                <a:hlinkClick r:id="rId8" tooltip="Multiset"/>
+              </a:rPr>
+              <a:t>multiset</a:t>
+            </a:r>
+            <a:r>
+              <a:rPr lang="en-GB" sz="1400" dirty="0"/>
+              <a:t> of data items distributed over a cluster of machines, that is maintained in a </a:t>
+            </a:r>
+            <a:r>
+              <a:rPr lang="en-GB" sz="1400" dirty="0">
+                <a:hlinkClick r:id="rId9" tooltip="Fault-tolerant computing"/>
+              </a:rPr>
+              <a:t>fault-tolerant</a:t>
+            </a:r>
+            <a:r>
+              <a:rPr lang="en-GB" sz="1400" dirty="0"/>
+              <a:t> </a:t>
+            </a:r>
+            <a:r>
+              <a:rPr lang="en-GB" sz="1400" dirty="0" smtClean="0"/>
+              <a:t>way</a:t>
+            </a:r>
+          </a:p>
+          <a:p>
+            <a:pPr lvl="1">
+              <a:buFont typeface="Wingdings" panose="05000000000000000000" pitchFamily="2" charset="2"/>
+              <a:buChar char="Ø"/>
+            </a:pPr>
+            <a:r>
+              <a:rPr lang="en-GB" sz="1400" dirty="0"/>
+              <a:t>The availability of RDDs facilitates the implementation of both </a:t>
+            </a:r>
+            <a:r>
+              <a:rPr lang="en-GB" sz="1400" dirty="0">
+                <a:hlinkClick r:id="rId10" tooltip="Iterative algorithm"/>
+              </a:rPr>
+              <a:t>iterative algorithms</a:t>
+            </a:r>
+            <a:r>
+              <a:rPr lang="en-GB" sz="1400" dirty="0"/>
+              <a:t>, that visit their dataset multiple times in a loop, and interactive/exploratory data analysis, i.e., the repeated </a:t>
+            </a:r>
+            <a:r>
+              <a:rPr lang="en-GB" sz="1400" dirty="0">
+                <a:hlinkClick r:id="rId11" tooltip="Database"/>
+              </a:rPr>
+              <a:t>database</a:t>
+            </a:r>
+            <a:r>
+              <a:rPr lang="en-GB" sz="1400" dirty="0"/>
+              <a:t>-style querying of </a:t>
+            </a:r>
+            <a:r>
+              <a:rPr lang="en-GB" sz="1400" dirty="0" smtClean="0"/>
+              <a:t>data</a:t>
+            </a:r>
+          </a:p>
+          <a:p>
+            <a:pPr lvl="1">
+              <a:buFont typeface="Wingdings" panose="05000000000000000000" pitchFamily="2" charset="2"/>
+              <a:buChar char="Ø"/>
+            </a:pPr>
+            <a:r>
+              <a:rPr lang="en-GB" sz="1400" dirty="0"/>
+              <a:t>Spark also supports a </a:t>
+            </a:r>
+            <a:r>
+              <a:rPr lang="en-GB" sz="1400" b="1" dirty="0"/>
+              <a:t>pseudo-distributed local mode</a:t>
+            </a:r>
+            <a:r>
+              <a:rPr lang="en-GB" sz="1400" dirty="0"/>
+              <a:t>, usually used only for development or testing purposes, where distributed storage is not required and the local file system can be used instead; in such a scenario, Spark is run on a single machine with one executor per </a:t>
+            </a:r>
+            <a:r>
+              <a:rPr lang="en-GB" sz="1400" dirty="0">
+                <a:hlinkClick r:id="rId12" tooltip="CPU core"/>
+              </a:rPr>
+              <a:t>CPU </a:t>
+            </a:r>
+            <a:r>
+              <a:rPr lang="en-GB" sz="1400" dirty="0" smtClean="0">
+                <a:hlinkClick r:id="rId12" tooltip="CPU core"/>
+              </a:rPr>
+              <a:t>core</a:t>
+            </a:r>
+            <a:endParaRPr lang="en-GB" sz="1400" dirty="0" smtClean="0"/>
+          </a:p>
+          <a:p>
+            <a:pPr lvl="1">
+              <a:buFont typeface="Wingdings" panose="05000000000000000000" pitchFamily="2" charset="2"/>
+              <a:buChar char="Ø"/>
+            </a:pPr>
+            <a:r>
+              <a:rPr lang="en-GB" sz="1400" dirty="0" smtClean="0"/>
+              <a:t>RDD is </a:t>
+            </a:r>
+            <a:r>
+              <a:rPr lang="en-GB" sz="1400" b="1" dirty="0" smtClean="0">
+                <a:solidFill>
+                  <a:srgbClr val="00B050"/>
+                </a:solidFill>
+              </a:rPr>
+              <a:t>immutable</a:t>
+            </a:r>
+            <a:r>
+              <a:rPr lang="en-GB" sz="1400" dirty="0" smtClean="0"/>
+              <a:t> and their operations are </a:t>
+            </a:r>
+            <a:r>
+              <a:rPr lang="en-GB" sz="1400" b="1" dirty="0" smtClean="0">
+                <a:solidFill>
+                  <a:srgbClr val="00B050"/>
+                </a:solidFill>
+              </a:rPr>
+              <a:t>lazy</a:t>
+            </a:r>
+          </a:p>
+          <a:p>
+            <a:pPr lvl="1">
+              <a:buFont typeface="Wingdings" panose="05000000000000000000" pitchFamily="2" charset="2"/>
+              <a:buChar char="Ø"/>
+            </a:pPr>
+            <a:endParaRPr lang="en-GB" sz="1400" dirty="0"/>
           </a:p>
         </p:txBody>
       </p:sp>
     </p:spTree>
     <p:extLst>
       <p:ext uri="{BB962C8B-B14F-4D97-AF65-F5344CB8AC3E}">
-        <p14:creationId xmlns:p14="http://schemas.microsoft.com/office/powerpoint/2010/main" val="3470886284"/>
+        <p14:creationId xmlns:p14="http://schemas.microsoft.com/office/powerpoint/2010/main" val="2583158910"/>
       </p:ext>
     </p:extLst>
   </p:cSld>
@@ -5324,7 +5394,7 @@
           <a:p>
             <a:r>
               <a:rPr lang="en-US" dirty="0" smtClean="0"/>
-              <a:t>Apache Spark – Disadvantages</a:t>
+              <a:t>Apache Spark – Advantages</a:t>
             </a:r>
             <a:endParaRPr lang="en-US" dirty="0"/>
           </a:p>
@@ -5348,50 +5418,76 @@
           <a:lstStyle/>
           <a:p>
             <a:r>
+              <a:rPr lang="en-GB" sz="1600" b="1" dirty="0" smtClean="0"/>
+              <a:t>In-memory data storage </a:t>
+            </a:r>
+            <a:r>
               <a:rPr lang="en-GB" sz="1600" dirty="0" smtClean="0"/>
-              <a:t>It doesn’t have its own distributed storage system. It uses HDFS (</a:t>
-            </a:r>
-            <a:r>
-              <a:rPr lang="en-US" sz="1600" dirty="0"/>
-              <a:t>Hadoop Distributed File </a:t>
-            </a:r>
-            <a:r>
-              <a:rPr lang="en-US" sz="1600" dirty="0" smtClean="0"/>
-              <a:t>System)</a:t>
+              <a:t>and near real-time processing. So, it performs several times faster than other big data technologies</a:t>
+            </a:r>
+          </a:p>
+          <a:p>
+            <a:r>
+              <a:rPr lang="en-GB" sz="1600" dirty="0"/>
+              <a:t>Spark also supports </a:t>
+            </a:r>
+            <a:r>
+              <a:rPr lang="en-GB" sz="1600" b="1" dirty="0"/>
+              <a:t>lazy evaluation </a:t>
+            </a:r>
+            <a:r>
+              <a:rPr lang="en-GB" sz="1600" dirty="0"/>
+              <a:t>of big data queries, which helps with optimization of the steps in data processing </a:t>
             </a:r>
             <a:r>
               <a:rPr lang="en-GB" sz="1600" dirty="0" smtClean="0"/>
-              <a:t>. </a:t>
-            </a:r>
-            <a:r>
-              <a:rPr lang="en-GB" sz="1600" dirty="0"/>
-              <a:t>Distributed storage is fundamental to many of today’s Big Data </a:t>
-            </a:r>
+              <a:t>workflows</a:t>
+            </a:r>
+          </a:p>
+          <a:p>
             <a:r>
               <a:rPr lang="en-GB" sz="1600" dirty="0" smtClean="0"/>
-              <a:t>projects</a:t>
-            </a:r>
-          </a:p>
-          <a:p>
+              <a:t>API improves </a:t>
+            </a:r>
+            <a:r>
+              <a:rPr lang="en-GB" sz="1600" b="1" dirty="0" smtClean="0"/>
+              <a:t>developer productivity</a:t>
+            </a:r>
             <a:r>
               <a:rPr lang="en-GB" sz="1600" dirty="0" smtClean="0"/>
-              <a:t>Security </a:t>
-            </a:r>
-            <a:r>
-              <a:rPr lang="en-GB" sz="1600" dirty="0"/>
-              <a:t>and support infrastructure </a:t>
+              <a:t> </a:t>
+            </a:r>
+          </a:p>
+          <a:p>
+            <a:r>
+              <a:rPr lang="en-GB" sz="1600" dirty="0"/>
+              <a:t>It’s designed to be an execution engine that works both in-memory and on-disk</a:t>
+            </a:r>
+            <a:endParaRPr lang="en-GB" sz="1600" dirty="0" smtClean="0"/>
+          </a:p>
+          <a:p>
+            <a:r>
+              <a:rPr lang="en-GB" sz="1600" dirty="0"/>
+              <a:t>Spark will attempt to store as much as data in memory and then will spill to </a:t>
             </a:r>
             <a:r>
               <a:rPr lang="en-GB" sz="1600" dirty="0" smtClean="0"/>
-              <a:t>is </a:t>
-            </a:r>
-            <a:r>
-              <a:rPr lang="en-GB" sz="1600" dirty="0"/>
-              <a:t>not as advanced</a:t>
-            </a:r>
-            <a:endParaRPr lang="en-GB" sz="1600" dirty="0" smtClean="0"/>
-          </a:p>
-          <a:p>
+              <a:t>disk</a:t>
+            </a:r>
+          </a:p>
+          <a:p>
+            <a:r>
+              <a:rPr lang="en-GB" sz="1600" dirty="0"/>
+              <a:t>Offers </a:t>
+            </a:r>
+            <a:r>
+              <a:rPr lang="en-GB" sz="1600" b="1" dirty="0"/>
+              <a:t>interactive shell</a:t>
+            </a:r>
+            <a:r>
+              <a:rPr lang="en-GB" sz="1600" dirty="0"/>
+              <a:t> for Scala and Python. This is not available in Java yet</a:t>
+            </a:r>
             <a:endParaRPr lang="en-GB" sz="1600" dirty="0" smtClean="0"/>
           </a:p>
           <a:p>
@@ -5406,7 +5502,7 @@
     </p:spTree>
     <p:extLst>
       <p:ext uri="{BB962C8B-B14F-4D97-AF65-F5344CB8AC3E}">
-        <p14:creationId xmlns:p14="http://schemas.microsoft.com/office/powerpoint/2010/main" val="4189899996"/>
+        <p14:creationId xmlns:p14="http://schemas.microsoft.com/office/powerpoint/2010/main" val="3470886284"/>
       </p:ext>
     </p:extLst>
   </p:cSld>
@@ -5459,7 +5555,7 @@
           <a:p>
             <a:r>
               <a:rPr lang="en-US" dirty="0" smtClean="0"/>
-              <a:t>Apache Spark - Ecosystem</a:t>
+              <a:t>Apache Spark – Disadvantages</a:t>
             </a:r>
             <a:endParaRPr lang="en-US" dirty="0"/>
           </a:p>
@@ -5484,65 +5580,64 @@
           <a:p>
             <a:r>
               <a:rPr lang="en-GB" sz="1600" dirty="0" smtClean="0"/>
-              <a:t>Apache Spark Components</a:t>
-            </a:r>
+              <a:t>It doesn’t have its own distributed storage system. It uses HDFS (</a:t>
+            </a:r>
+            <a:r>
+              <a:rPr lang="en-US" sz="1600" dirty="0"/>
+              <a:t>Hadoop Distributed File </a:t>
+            </a:r>
+            <a:r>
+              <a:rPr lang="en-US" sz="1600" dirty="0" smtClean="0"/>
+              <a:t>System)</a:t>
+            </a:r>
+            <a:r>
+              <a:rPr lang="en-GB" sz="1600" dirty="0" smtClean="0"/>
+              <a:t>. </a:t>
+            </a:r>
+            <a:r>
+              <a:rPr lang="en-GB" sz="1600" dirty="0"/>
+              <a:t>Distributed storage is fundamental to many of today’s Big Data </a:t>
+            </a:r>
+            <a:r>
+              <a:rPr lang="en-GB" sz="1600" dirty="0" smtClean="0"/>
+              <a:t>projects</a:t>
+            </a:r>
+          </a:p>
+          <a:p>
+            <a:r>
+              <a:rPr lang="en-GB" sz="1600" dirty="0" smtClean="0"/>
+              <a:t>Security </a:t>
+            </a:r>
+            <a:r>
+              <a:rPr lang="en-GB" sz="1600" dirty="0"/>
+              <a:t>and support infrastructure </a:t>
+            </a:r>
+            <a:r>
+              <a:rPr lang="en-GB" sz="1600" dirty="0" smtClean="0"/>
+              <a:t>is </a:t>
+            </a:r>
+            <a:r>
+              <a:rPr lang="en-GB" sz="1600" dirty="0"/>
+              <a:t>not as advanced</a:t>
+            </a:r>
+            <a:endParaRPr lang="en-GB" sz="1600" dirty="0" smtClean="0"/>
+          </a:p>
+          <a:p>
+            <a:endParaRPr lang="en-GB" sz="1600" dirty="0" smtClean="0"/>
           </a:p>
           <a:p>
             <a:pPr lvl="1">
               <a:buFont typeface="Wingdings" panose="05000000000000000000" pitchFamily="2" charset="2"/>
               <a:buChar char="Ø"/>
             </a:pPr>
-            <a:r>
-              <a:rPr lang="en-GB" sz="1400" dirty="0" smtClean="0"/>
-              <a:t>Spark Core</a:t>
-            </a:r>
-          </a:p>
-          <a:p>
-            <a:pPr lvl="1">
-              <a:buFont typeface="Wingdings" panose="05000000000000000000" pitchFamily="2" charset="2"/>
-              <a:buChar char="Ø"/>
-            </a:pPr>
-            <a:r>
-              <a:rPr lang="en-GB" sz="1400" dirty="0" smtClean="0"/>
-              <a:t>Spark SQL</a:t>
-            </a:r>
-          </a:p>
-          <a:p>
-            <a:pPr lvl="1">
-              <a:buFont typeface="Wingdings" panose="05000000000000000000" pitchFamily="2" charset="2"/>
-              <a:buChar char="Ø"/>
-            </a:pPr>
-            <a:r>
-              <a:rPr lang="en-GB" sz="1400" dirty="0" smtClean="0"/>
-              <a:t>Spark Streaming</a:t>
-            </a:r>
-          </a:p>
-          <a:p>
-            <a:pPr lvl="1">
-              <a:buFont typeface="Wingdings" panose="05000000000000000000" pitchFamily="2" charset="2"/>
-              <a:buChar char="Ø"/>
-            </a:pPr>
-            <a:r>
-              <a:rPr lang="en-GB" sz="1400" dirty="0" smtClean="0"/>
-              <a:t>Spark MLlib</a:t>
-            </a:r>
-          </a:p>
-          <a:p>
-            <a:pPr lvl="1">
-              <a:buFont typeface="Wingdings" panose="05000000000000000000" pitchFamily="2" charset="2"/>
-              <a:buChar char="Ø"/>
-            </a:pPr>
-            <a:r>
-              <a:rPr lang="en-GB" sz="1400" dirty="0" smtClean="0"/>
-              <a:t>GraphX</a:t>
-            </a:r>
+            <a:endParaRPr lang="en-GB" sz="1600" dirty="0"/>
           </a:p>
         </p:txBody>
       </p:sp>
     </p:spTree>
     <p:extLst>
       <p:ext uri="{BB962C8B-B14F-4D97-AF65-F5344CB8AC3E}">
-        <p14:creationId xmlns:p14="http://schemas.microsoft.com/office/powerpoint/2010/main" val="3046215406"/>
+        <p14:creationId xmlns:p14="http://schemas.microsoft.com/office/powerpoint/2010/main" val="4189899996"/>
       </p:ext>
     </p:extLst>
   </p:cSld>
@@ -5653,6 +5748,142 @@
 </file>
 
 <file path=ppt/slides/slide20.xml><?xml version="1.0" encoding="utf-8"?>
+<p:sld xmlns:a="http://schemas.openxmlformats.org/drawingml/2006/main" xmlns:r="http://schemas.openxmlformats.org/officeDocument/2006/relationships" xmlns:p="http://schemas.openxmlformats.org/presentationml/2006/main">
+  <p:cSld>
+    <p:spTree>
+      <p:nvGrpSpPr>
+        <p:cNvPr id="1" name=""/>
+        <p:cNvGrpSpPr/>
+        <p:nvPr/>
+      </p:nvGrpSpPr>
+      <p:grpSpPr>
+        <a:xfrm>
+          <a:off x="0" y="0"/>
+          <a:ext cx="0" cy="0"/>
+          <a:chOff x="0" y="0"/>
+          <a:chExt cx="0" cy="0"/>
+        </a:xfrm>
+      </p:grpSpPr>
+      <p:sp>
+        <p:nvSpPr>
+          <p:cNvPr id="2" name="Title 1"/>
+          <p:cNvSpPr>
+            <a:spLocks noGrp="1"/>
+          </p:cNvSpPr>
+          <p:nvPr>
+            <p:ph type="title"/>
+          </p:nvPr>
+        </p:nvSpPr>
+        <p:spPr/>
+        <p:txBody>
+          <a:bodyPr>
+            <a:normAutofit/>
+          </a:bodyPr>
+          <a:lstStyle/>
+          <a:p>
+            <a:r>
+              <a:rPr lang="en-US" dirty="0" smtClean="0"/>
+              <a:t>Apache Spark - Ecosystem</a:t>
+            </a:r>
+            <a:endParaRPr lang="en-US" dirty="0"/>
+          </a:p>
+        </p:txBody>
+      </p:sp>
+      <p:sp>
+        <p:nvSpPr>
+          <p:cNvPr id="3" name="Content Placeholder 2"/>
+          <p:cNvSpPr>
+            <a:spLocks noGrp="1"/>
+          </p:cNvSpPr>
+          <p:nvPr>
+            <p:ph idx="1"/>
+          </p:nvPr>
+        </p:nvSpPr>
+        <p:spPr/>
+        <p:txBody>
+          <a:bodyPr>
+            <a:normAutofit/>
+          </a:bodyPr>
+          <a:lstStyle/>
+          <a:p>
+            <a:r>
+              <a:rPr lang="en-GB" sz="1600" dirty="0" smtClean="0"/>
+              <a:t>Apache Spark Components</a:t>
+            </a:r>
+          </a:p>
+          <a:p>
+            <a:pPr lvl="1">
+              <a:buFont typeface="Wingdings" panose="05000000000000000000" pitchFamily="2" charset="2"/>
+              <a:buChar char="Ø"/>
+            </a:pPr>
+            <a:r>
+              <a:rPr lang="en-GB" sz="1400" dirty="0" smtClean="0"/>
+              <a:t>Spark Core</a:t>
+            </a:r>
+          </a:p>
+          <a:p>
+            <a:pPr lvl="1">
+              <a:buFont typeface="Wingdings" panose="05000000000000000000" pitchFamily="2" charset="2"/>
+              <a:buChar char="Ø"/>
+            </a:pPr>
+            <a:r>
+              <a:rPr lang="en-GB" sz="1400" dirty="0" smtClean="0"/>
+              <a:t>Spark SQL</a:t>
+            </a:r>
+          </a:p>
+          <a:p>
+            <a:pPr lvl="1">
+              <a:buFont typeface="Wingdings" panose="05000000000000000000" pitchFamily="2" charset="2"/>
+              <a:buChar char="Ø"/>
+            </a:pPr>
+            <a:r>
+              <a:rPr lang="en-GB" sz="1400" dirty="0" smtClean="0"/>
+              <a:t>Spark Streaming</a:t>
+            </a:r>
+          </a:p>
+          <a:p>
+            <a:pPr lvl="1">
+              <a:buFont typeface="Wingdings" panose="05000000000000000000" pitchFamily="2" charset="2"/>
+              <a:buChar char="Ø"/>
+            </a:pPr>
+            <a:r>
+              <a:rPr lang="en-GB" sz="1400" dirty="0" smtClean="0"/>
+              <a:t>Spark MLlib</a:t>
+            </a:r>
+          </a:p>
+          <a:p>
+            <a:pPr lvl="1">
+              <a:buFont typeface="Wingdings" panose="05000000000000000000" pitchFamily="2" charset="2"/>
+              <a:buChar char="Ø"/>
+            </a:pPr>
+            <a:r>
+              <a:rPr lang="en-GB" sz="1400" dirty="0" smtClean="0"/>
+              <a:t>GraphX</a:t>
+            </a:r>
+          </a:p>
+        </p:txBody>
+      </p:sp>
+    </p:spTree>
+    <p:extLst>
+      <p:ext uri="{BB962C8B-B14F-4D97-AF65-F5344CB8AC3E}">
+        <p14:creationId xmlns:p14="http://schemas.microsoft.com/office/powerpoint/2010/main" val="3046215406"/>
+      </p:ext>
+    </p:extLst>
+  </p:cSld>
+  <p:clrMapOvr>
+    <a:masterClrMapping/>
+  </p:clrMapOvr>
+  <p:timing>
+    <p:tnLst>
+      <p:par>
+        <p:cTn id="1" dur="indefinite" restart="never" nodeType="tmRoot"/>
+      </p:par>
+    </p:tnLst>
+  </p:timing>
+</p:sld>
+</file>
+
+<file path=ppt/slides/slide21.xml><?xml version="1.0" encoding="utf-8"?>
 <p:sld xmlns:a="http://schemas.openxmlformats.org/drawingml/2006/main" xmlns:r="http://schemas.openxmlformats.org/officeDocument/2006/relationships" xmlns:p="http://schemas.openxmlformats.org/presentationml/2006/main">
   <p:cSld>
     <p:spTree>
@@ -5770,356 +6001,6 @@
 </p:sld>
 </file>
 
-<file path=ppt/slides/slide21.xml><?xml version="1.0" encoding="utf-8"?>
-<p:sld xmlns:a="http://schemas.openxmlformats.org/drawingml/2006/main" xmlns:r="http://schemas.openxmlformats.org/officeDocument/2006/relationships" xmlns:p="http://schemas.openxmlformats.org/presentationml/2006/main">
-  <p:cSld>
-    <p:spTree>
-      <p:nvGrpSpPr>
-        <p:cNvPr id="1" name=""/>
-        <p:cNvGrpSpPr/>
-        <p:nvPr/>
-      </p:nvGrpSpPr>
-      <p:grpSpPr>
-        <a:xfrm>
-          <a:off x="0" y="0"/>
-          <a:ext cx="0" cy="0"/>
-          <a:chOff x="0" y="0"/>
-          <a:chExt cx="0" cy="0"/>
-        </a:xfrm>
-      </p:grpSpPr>
-      <p:sp>
-        <p:nvSpPr>
-          <p:cNvPr id="2" name="Title 1"/>
-          <p:cNvSpPr>
-            <a:spLocks noGrp="1"/>
-          </p:cNvSpPr>
-          <p:nvPr>
-            <p:ph type="title"/>
-          </p:nvPr>
-        </p:nvSpPr>
-        <p:spPr/>
-        <p:txBody>
-          <a:bodyPr>
-            <a:normAutofit/>
-          </a:bodyPr>
-          <a:lstStyle/>
-          <a:p>
-            <a:r>
-              <a:rPr lang="en-US" dirty="0" smtClean="0"/>
-              <a:t>Apache Spark - Core</a:t>
-            </a:r>
-            <a:endParaRPr lang="en-US" dirty="0"/>
-          </a:p>
-        </p:txBody>
-      </p:sp>
-      <p:sp>
-        <p:nvSpPr>
-          <p:cNvPr id="3" name="Content Placeholder 2"/>
-          <p:cNvSpPr>
-            <a:spLocks noGrp="1"/>
-          </p:cNvSpPr>
-          <p:nvPr>
-            <p:ph idx="1"/>
-          </p:nvPr>
-        </p:nvSpPr>
-        <p:spPr/>
-        <p:txBody>
-          <a:bodyPr>
-            <a:normAutofit/>
-          </a:bodyPr>
-          <a:lstStyle/>
-          <a:p>
-            <a:r>
-              <a:rPr lang="en-GB" sz="1600" dirty="0"/>
-              <a:t>Spark Core is the foundation of the overall </a:t>
-            </a:r>
-            <a:r>
-              <a:rPr lang="en-GB" sz="1600" dirty="0" smtClean="0"/>
-              <a:t>project</a:t>
-            </a:r>
-          </a:p>
-          <a:p>
-            <a:r>
-              <a:rPr lang="en-GB" sz="1600" dirty="0"/>
-              <a:t>It provides </a:t>
-            </a:r>
-            <a:r>
-              <a:rPr lang="en-GB" sz="1600" b="1" dirty="0"/>
-              <a:t>distributed task dispatching, scheduling</a:t>
-            </a:r>
-            <a:r>
-              <a:rPr lang="en-GB" sz="1600" dirty="0"/>
-              <a:t>, and </a:t>
-            </a:r>
-            <a:r>
-              <a:rPr lang="en-GB" sz="1600" b="1" dirty="0"/>
-              <a:t>basic </a:t>
-            </a:r>
-            <a:r>
-              <a:rPr lang="en-GB" sz="1600" b="1" dirty="0">
-                <a:hlinkClick r:id="rId2" tooltip="I/O interface"/>
-              </a:rPr>
-              <a:t>I/O</a:t>
-            </a:r>
-            <a:r>
-              <a:rPr lang="en-GB" sz="1600" b="1" dirty="0"/>
-              <a:t> functionalities</a:t>
-            </a:r>
-            <a:r>
-              <a:rPr lang="en-GB" sz="1600" dirty="0"/>
-              <a:t>, exposed through an application programming interface (for </a:t>
-            </a:r>
-            <a:r>
-              <a:rPr lang="en-GB" sz="1600" dirty="0">
-                <a:hlinkClick r:id="rId3" tooltip="Java"/>
-              </a:rPr>
-              <a:t>Java</a:t>
-            </a:r>
-            <a:r>
-              <a:rPr lang="en-GB" sz="1600" dirty="0"/>
-              <a:t>, </a:t>
-            </a:r>
-            <a:r>
-              <a:rPr lang="en-GB" sz="1600" dirty="0">
-                <a:hlinkClick r:id="rId4" tooltip="Python (programming language)"/>
-              </a:rPr>
-              <a:t>Python</a:t>
-            </a:r>
-            <a:r>
-              <a:rPr lang="en-GB" sz="1600" dirty="0"/>
-              <a:t>, </a:t>
-            </a:r>
-            <a:r>
-              <a:rPr lang="en-GB" sz="1600" dirty="0">
-                <a:hlinkClick r:id="rId5" tooltip="Scala (programming language)"/>
-              </a:rPr>
-              <a:t>Scala</a:t>
-            </a:r>
-            <a:r>
-              <a:rPr lang="en-GB" sz="1600" dirty="0"/>
-              <a:t>, and </a:t>
-            </a:r>
-            <a:r>
-              <a:rPr lang="en-GB" sz="1600" dirty="0">
-                <a:hlinkClick r:id="rId6" tooltip="R (programming language)"/>
-              </a:rPr>
-              <a:t>R</a:t>
-            </a:r>
-            <a:r>
-              <a:rPr lang="en-GB" sz="1600" dirty="0"/>
-              <a:t>) centered on the RDD </a:t>
-            </a:r>
-            <a:r>
-              <a:rPr lang="en-GB" sz="1600" u="sng" dirty="0" smtClean="0">
-                <a:hlinkClick r:id="rId7" tooltip="Abstraction (computer science)"/>
-              </a:rPr>
-              <a:t>abstraction</a:t>
-            </a:r>
-            <a:endParaRPr lang="en-GB" sz="1600" u="sng" dirty="0" smtClean="0"/>
-          </a:p>
-          <a:p>
-            <a:r>
-              <a:rPr lang="en-GB" sz="1600" dirty="0"/>
-              <a:t>This interface mirrors a </a:t>
-            </a:r>
-            <a:r>
-              <a:rPr lang="en-GB" sz="1600" dirty="0">
-                <a:hlinkClick r:id="rId8" tooltip="Functional programming"/>
-              </a:rPr>
-              <a:t>functional</a:t>
-            </a:r>
-            <a:r>
-              <a:rPr lang="en-GB" sz="1600" dirty="0"/>
-              <a:t>/</a:t>
-            </a:r>
-            <a:r>
-              <a:rPr lang="en-GB" sz="1600" dirty="0">
-                <a:hlinkClick r:id="rId9" tooltip="Higher-order programming"/>
-              </a:rPr>
-              <a:t>higher-order</a:t>
-            </a:r>
-            <a:r>
-              <a:rPr lang="en-GB" sz="1600" dirty="0"/>
-              <a:t> model of programming: a "driver" program invokes parallel operations such as map, </a:t>
-            </a:r>
-            <a:r>
-              <a:rPr lang="en-GB" sz="1600" dirty="0">
-                <a:hlinkClick r:id="rId10" tooltip="Filter (computer science)"/>
-              </a:rPr>
-              <a:t>filter</a:t>
-            </a:r>
-            <a:r>
-              <a:rPr lang="en-GB" sz="1600" dirty="0"/>
-              <a:t> or reduce on an RDD by passing a function to Spark, which then schedules the function's execution in parallel on the </a:t>
-            </a:r>
-            <a:r>
-              <a:rPr lang="en-GB" sz="1600" dirty="0" smtClean="0"/>
-              <a:t>cluster.</a:t>
-            </a:r>
-            <a:r>
-              <a:rPr lang="en-GB" sz="1600" baseline="30000" dirty="0"/>
-              <a:t> </a:t>
-            </a:r>
-            <a:r>
-              <a:rPr lang="en-GB" sz="1600" dirty="0" smtClean="0"/>
-              <a:t>These </a:t>
-            </a:r>
-            <a:r>
-              <a:rPr lang="en-GB" sz="1600" dirty="0"/>
-              <a:t>operations, and additional ones such as </a:t>
-            </a:r>
-            <a:r>
-              <a:rPr lang="en-GB" sz="1600" dirty="0">
-                <a:hlinkClick r:id="rId11" tooltip="Join (database)"/>
-              </a:rPr>
-              <a:t>joins</a:t>
-            </a:r>
-            <a:r>
-              <a:rPr lang="en-GB" sz="1600" dirty="0"/>
-              <a:t>, take RDDs as input and produce new </a:t>
-            </a:r>
-            <a:r>
-              <a:rPr lang="en-GB" sz="1600" dirty="0" smtClean="0"/>
-              <a:t>RDDs</a:t>
-            </a:r>
-          </a:p>
-          <a:p>
-            <a:r>
-              <a:rPr lang="en-GB" sz="1600" dirty="0" smtClean="0"/>
-              <a:t>Fault-tolerance </a:t>
-            </a:r>
-            <a:r>
-              <a:rPr lang="en-GB" sz="1600" dirty="0"/>
-              <a:t>is achieved by keeping track of the </a:t>
-            </a:r>
-            <a:r>
-              <a:rPr lang="en-GB" sz="1600" b="1" dirty="0">
-                <a:solidFill>
-                  <a:srgbClr val="00B050"/>
-                </a:solidFill>
-              </a:rPr>
-              <a:t>"lineage" </a:t>
-            </a:r>
-            <a:r>
-              <a:rPr lang="en-GB" sz="1600" dirty="0"/>
-              <a:t>of each RDD, the sequence of operations produced it, so that it can be reconstructed in the case of data </a:t>
-            </a:r>
-            <a:r>
-              <a:rPr lang="en-GB" sz="1600" dirty="0" smtClean="0"/>
-              <a:t>loss</a:t>
-            </a:r>
-          </a:p>
-          <a:p>
-            <a:r>
-              <a:rPr lang="en-GB" sz="1600" dirty="0"/>
-              <a:t>Spark provides </a:t>
-            </a:r>
-            <a:r>
-              <a:rPr lang="en-GB" sz="1600" b="1" dirty="0">
-                <a:solidFill>
-                  <a:srgbClr val="00B050"/>
-                </a:solidFill>
-              </a:rPr>
-              <a:t>two types of shared variables </a:t>
-            </a:r>
-            <a:r>
-              <a:rPr lang="en-GB" sz="1600" dirty="0"/>
-              <a:t>to make it efficient to run the Spark programs in a cluster. These are Broadcast Variables and </a:t>
-            </a:r>
-            <a:r>
-              <a:rPr lang="en-GB" sz="1600" dirty="0" smtClean="0"/>
-              <a:t>Accumulators</a:t>
-            </a:r>
-          </a:p>
-          <a:p>
-            <a:pPr lvl="1">
-              <a:buFont typeface="Wingdings" panose="05000000000000000000" pitchFamily="2" charset="2"/>
-              <a:buChar char="Ø"/>
-            </a:pPr>
-            <a:r>
-              <a:rPr lang="en-GB" sz="1400" b="1" i="1" dirty="0" smtClean="0"/>
-              <a:t>broadcast </a:t>
-            </a:r>
-            <a:r>
-              <a:rPr lang="en-GB" sz="1400" b="1" i="1" dirty="0"/>
-              <a:t>variables</a:t>
-            </a:r>
-            <a:r>
-              <a:rPr lang="en-GB" sz="1400" dirty="0"/>
-              <a:t> reference read-only data that needs to be available on all </a:t>
-            </a:r>
-            <a:r>
-              <a:rPr lang="en-GB" sz="1400" dirty="0" smtClean="0"/>
-              <a:t>nodes</a:t>
-            </a:r>
-          </a:p>
-          <a:p>
-            <a:pPr lvl="1">
-              <a:buFont typeface="Wingdings" panose="05000000000000000000" pitchFamily="2" charset="2"/>
-              <a:buChar char="Ø"/>
-            </a:pPr>
-            <a:r>
-              <a:rPr lang="en-GB" sz="1400" b="1" i="1" dirty="0" smtClean="0"/>
-              <a:t>accumulators</a:t>
-            </a:r>
-            <a:r>
-              <a:rPr lang="en-GB" sz="1400" dirty="0"/>
-              <a:t> can be used to program reductions in an </a:t>
-            </a:r>
-            <a:r>
-              <a:rPr lang="en-GB" sz="1400" dirty="0">
-                <a:hlinkClick r:id="rId12" tooltip="Imperative programming"/>
-              </a:rPr>
-              <a:t>imperative</a:t>
-            </a:r>
-            <a:r>
-              <a:rPr lang="en-GB" sz="1400" dirty="0"/>
-              <a:t> </a:t>
-            </a:r>
-            <a:r>
-              <a:rPr lang="en-GB" sz="1400" dirty="0" smtClean="0"/>
-              <a:t>style. </a:t>
-            </a:r>
-            <a:r>
-              <a:rPr lang="en-GB" sz="1400" dirty="0"/>
-              <a:t>They can be used to implement </a:t>
-            </a:r>
-            <a:r>
-              <a:rPr lang="en-GB" sz="1400" b="1" dirty="0"/>
-              <a:t>counters</a:t>
-            </a:r>
-            <a:r>
-              <a:rPr lang="en-GB" sz="1400" dirty="0"/>
-              <a:t> (as in MapReduce) or </a:t>
-            </a:r>
-            <a:r>
-              <a:rPr lang="en-GB" sz="1400" b="1" dirty="0"/>
-              <a:t>sums</a:t>
-            </a:r>
-            <a:endParaRPr lang="en-GB" sz="1400" b="1" dirty="0" smtClean="0"/>
-          </a:p>
-        </p:txBody>
-      </p:sp>
-    </p:spTree>
-    <p:extLst>
-      <p:ext uri="{BB962C8B-B14F-4D97-AF65-F5344CB8AC3E}">
-        <p14:creationId xmlns:p14="http://schemas.microsoft.com/office/powerpoint/2010/main" val="712227284"/>
-      </p:ext>
-    </p:extLst>
-  </p:cSld>
-  <p:clrMapOvr>
-    <a:masterClrMapping/>
-  </p:clrMapOvr>
-  <p:timing>
-    <p:tnLst>
-      <p:par>
-        <p:cTn id="1" dur="indefinite" restart="never" nodeType="tmRoot"/>
-      </p:par>
-    </p:tnLst>
-  </p:timing>
-</p:sld>
-</file>
-
 <file path=ppt/slides/slide22.xml><?xml version="1.0" encoding="utf-8"?>
 <p:sld xmlns:a="http://schemas.openxmlformats.org/drawingml/2006/main" xmlns:r="http://schemas.openxmlformats.org/officeDocument/2006/relationships" xmlns:p="http://schemas.openxmlformats.org/presentationml/2006/main">
   <p:cSld>
@@ -6180,83 +6061,167 @@
           <a:lstStyle/>
           <a:p>
             <a:r>
+              <a:rPr lang="en-GB" sz="1600" dirty="0"/>
+              <a:t>Spark Core is the foundation of the overall </a:t>
+            </a:r>
+            <a:r>
               <a:rPr lang="en-GB" sz="1600" dirty="0" smtClean="0"/>
-              <a:t>RDD supports two types of operations:</a:t>
-            </a:r>
-          </a:p>
-          <a:p>
-            <a:pPr lvl="1">
-              <a:buFont typeface="Wingdings" panose="05000000000000000000" pitchFamily="2" charset="2"/>
-              <a:buChar char="Ø"/>
-            </a:pPr>
-            <a:r>
-              <a:rPr lang="en-GB" sz="1400" dirty="0" smtClean="0"/>
-              <a:t>Transformation</a:t>
-            </a:r>
-          </a:p>
-          <a:p>
-            <a:pPr lvl="1">
-              <a:buFont typeface="Wingdings" panose="05000000000000000000" pitchFamily="2" charset="2"/>
-              <a:buChar char="Ø"/>
-            </a:pPr>
-            <a:r>
-              <a:rPr lang="en-GB" sz="1400" dirty="0" smtClean="0"/>
-              <a:t>Action</a:t>
-            </a:r>
-          </a:p>
-          <a:p>
+              <a:t>project</a:t>
+            </a:r>
+          </a:p>
+          <a:p>
+            <a:r>
+              <a:rPr lang="en-GB" sz="1600" dirty="0"/>
+              <a:t>It provides </a:t>
+            </a:r>
             <a:r>
               <a:rPr lang="en-GB" sz="1600" b="1" dirty="0"/>
-              <a:t>Transformation:</a:t>
-            </a:r>
-            <a:r>
-              <a:rPr lang="en-GB" sz="1600" dirty="0"/>
-              <a:t> </a:t>
+              <a:t>distributed task dispatching, scheduling</a:t>
+            </a:r>
+            <a:r>
+              <a:rPr lang="en-GB" sz="1600" dirty="0"/>
+              <a:t>, and </a:t>
+            </a:r>
+            <a:r>
+              <a:rPr lang="en-GB" sz="1600" b="1" dirty="0"/>
+              <a:t>basic </a:t>
+            </a:r>
+            <a:r>
+              <a:rPr lang="en-GB" sz="1600" b="1" dirty="0">
+                <a:hlinkClick r:id="rId2" tooltip="I/O interface"/>
+              </a:rPr>
+              <a:t>I/O</a:t>
+            </a:r>
+            <a:r>
+              <a:rPr lang="en-GB" sz="1600" b="1" dirty="0"/>
+              <a:t> functionalities</a:t>
+            </a:r>
+            <a:r>
+              <a:rPr lang="en-GB" sz="1600" dirty="0"/>
+              <a:t>, exposed through an application programming interface (for </a:t>
             </a:r>
             <a:r>
               <a:rPr lang="en-GB" sz="1600" dirty="0">
-                <a:hlinkClick r:id="rId2"/>
+                <a:hlinkClick r:id="rId3" tooltip="Java"/>
               </a:rPr>
-              <a:t>Transformations</a:t>
-            </a:r>
-            <a:r>
-              <a:rPr lang="en-GB" sz="1600" dirty="0"/>
-              <a:t> don't return a single value, they return a new RDD. Nothing gets evaluated when you call a Transformation function, it just takes an RDD and return a new </a:t>
+              <a:t>Java</a:t>
+            </a:r>
+            <a:r>
+              <a:rPr lang="en-GB" sz="1600" dirty="0"/>
+              <a:t>, </a:t>
+            </a:r>
+            <a:r>
+              <a:rPr lang="en-GB" sz="1600" dirty="0">
+                <a:hlinkClick r:id="rId4" tooltip="Python (programming language)"/>
+              </a:rPr>
+              <a:t>Python</a:t>
+            </a:r>
+            <a:r>
+              <a:rPr lang="en-GB" sz="1600" dirty="0"/>
+              <a:t>, </a:t>
+            </a:r>
+            <a:r>
+              <a:rPr lang="en-GB" sz="1600" dirty="0">
+                <a:hlinkClick r:id="rId5" tooltip="Scala (programming language)"/>
+              </a:rPr>
+              <a:t>Scala</a:t>
+            </a:r>
+            <a:r>
+              <a:rPr lang="en-GB" sz="1600" dirty="0"/>
+              <a:t>, and </a:t>
+            </a:r>
+            <a:r>
+              <a:rPr lang="en-GB" sz="1600" dirty="0">
+                <a:hlinkClick r:id="rId6" tooltip="R (programming language)"/>
+              </a:rPr>
+              <a:t>R</a:t>
+            </a:r>
+            <a:r>
+              <a:rPr lang="en-GB" sz="1600" dirty="0"/>
+              <a:t>) centered on the RDD </a:t>
+            </a:r>
+            <a:r>
+              <a:rPr lang="en-GB" sz="1600" u="sng" dirty="0" smtClean="0">
+                <a:hlinkClick r:id="rId7" tooltip="Abstraction (computer science)"/>
+              </a:rPr>
+              <a:t>abstraction</a:t>
+            </a:r>
+            <a:endParaRPr lang="en-GB" sz="1600" u="sng" dirty="0" smtClean="0"/>
+          </a:p>
+          <a:p>
+            <a:r>
+              <a:rPr lang="en-GB" sz="1600" dirty="0"/>
+              <a:t>This interface mirrors a </a:t>
+            </a:r>
+            <a:r>
+              <a:rPr lang="en-GB" sz="1600" dirty="0">
+                <a:hlinkClick r:id="rId8" tooltip="Functional programming"/>
+              </a:rPr>
+              <a:t>functional</a:t>
+            </a:r>
+            <a:r>
+              <a:rPr lang="en-GB" sz="1600" dirty="0"/>
+              <a:t>/</a:t>
+            </a:r>
+            <a:r>
+              <a:rPr lang="en-GB" sz="1600" dirty="0">
+                <a:hlinkClick r:id="rId9" tooltip="Higher-order programming"/>
+              </a:rPr>
+              <a:t>higher-order</a:t>
+            </a:r>
+            <a:r>
+              <a:rPr lang="en-GB" sz="1600" dirty="0"/>
+              <a:t> model of programming: a "driver" program invokes parallel operations such as map, </a:t>
+            </a:r>
+            <a:r>
+              <a:rPr lang="en-GB" sz="1600" dirty="0">
+                <a:hlinkClick r:id="rId10" tooltip="Filter (computer science)"/>
+              </a:rPr>
+              <a:t>filter</a:t>
+            </a:r>
+            <a:r>
+              <a:rPr lang="en-GB" sz="1600" dirty="0"/>
+              <a:t> or reduce on an RDD by passing a function to Spark, which then schedules the function's execution in parallel on the </a:t>
             </a:r>
             <a:r>
               <a:rPr lang="en-GB" sz="1600" dirty="0" smtClean="0"/>
-              <a:t>RDD</a:t>
-            </a:r>
-            <a:endParaRPr lang="en-GB" sz="1600" dirty="0"/>
-          </a:p>
-          <a:p>
-            <a:r>
-              <a:rPr lang="en-GB" sz="1600" dirty="0"/>
-              <a:t>Some of the Transformation functions are map, filter, flatMap, groupByKey, reduceByKey, aggregateByKey, pipe, and </a:t>
+              <a:t>cluster.</a:t>
+            </a:r>
+            <a:r>
+              <a:rPr lang="en-GB" sz="1600" baseline="30000" dirty="0"/>
+              <a:t> </a:t>
             </a:r>
             <a:r>
               <a:rPr lang="en-GB" sz="1600" dirty="0" smtClean="0"/>
-              <a:t>coalesce</a:t>
-            </a:r>
-          </a:p>
-          <a:p>
-            <a:r>
-              <a:rPr lang="en-GB" sz="1600" b="1" dirty="0"/>
-              <a:t>Action:</a:t>
-            </a:r>
-            <a:r>
-              <a:rPr lang="en-GB" sz="1600" dirty="0"/>
-              <a:t> </a:t>
+              <a:t>These </a:t>
+            </a:r>
+            <a:r>
+              <a:rPr lang="en-GB" sz="1600" dirty="0"/>
+              <a:t>operations, and additional ones such as </a:t>
             </a:r>
             <a:r>
               <a:rPr lang="en-GB" sz="1600" dirty="0">
-                <a:hlinkClick r:id="rId3"/>
+                <a:hlinkClick r:id="rId11" tooltip="Join (database)"/>
               </a:rPr>
-              <a:t>Action</a:t>
-            </a:r>
-            <a:r>
-              <a:rPr lang="en-GB" sz="1600" dirty="0"/>
-              <a:t> operation evaluates and </a:t>
+              <a:t>joins</a:t>
+            </a:r>
+            <a:r>
+              <a:rPr lang="en-GB" sz="1600" dirty="0"/>
+              <a:t>, take RDDs as input and produce new </a:t>
+            </a:r>
+            <a:r>
+              <a:rPr lang="en-GB" sz="1600" dirty="0" smtClean="0"/>
+              <a:t>RDDs</a:t>
+            </a:r>
+          </a:p>
+          <a:p>
+            <a:r>
+              <a:rPr lang="en-GB" sz="1600" dirty="0" smtClean="0"/>
+              <a:t>Fault-tolerance </a:t>
+            </a:r>
+            <a:r>
+              <a:rPr lang="en-GB" sz="1600" dirty="0"/>
+              <a:t>is achieved by keeping track of the </a:t>
             </a:r>
             <a:r>
               <a:rPr lang="en-GB" sz="1600" b="1" dirty="0">
@@ -6264,45 +6229,112 @@
                   <a:srgbClr val="00B050"/>
                 </a:solidFill>
               </a:rPr>
-              <a:t>returns a new value</a:t>
-            </a:r>
-            <a:r>
-              <a:rPr lang="en-GB" sz="1600" dirty="0"/>
-              <a:t>. When an Action function is called on a RDD object, all the data processing queries are computed at that time and the result value is </a:t>
+              <a:t>"lineage" </a:t>
+            </a:r>
+            <a:r>
+              <a:rPr lang="en-GB" sz="1600" dirty="0"/>
+              <a:t>of each RDD, the sequence of operations produced it, so that it can be reconstructed in the case of data </a:t>
             </a:r>
             <a:r>
               <a:rPr lang="en-GB" sz="1600" dirty="0" smtClean="0"/>
-              <a:t>returned</a:t>
-            </a:r>
-            <a:endParaRPr lang="en-GB" sz="1600" dirty="0"/>
-          </a:p>
-          <a:p>
-            <a:r>
-              <a:rPr lang="en-GB" sz="1600" dirty="0"/>
-              <a:t>Some of the Action operations are reduce, collect, count, first, take, countByKey, and </a:t>
+              <a:t>loss</a:t>
+            </a:r>
+          </a:p>
+          <a:p>
+            <a:r>
+              <a:rPr lang="en-GB" sz="1600" dirty="0"/>
+              <a:t>Spark provides </a:t>
+            </a:r>
+            <a:r>
+              <a:rPr lang="en-GB" sz="1600" b="1" dirty="0">
+                <a:solidFill>
+                  <a:srgbClr val="00B050"/>
+                </a:solidFill>
+              </a:rPr>
+              <a:t>two types of shared variables </a:t>
+            </a:r>
+            <a:r>
+              <a:rPr lang="en-GB" sz="1600" dirty="0"/>
+              <a:t>to make it efficient to run the Spark programs in a cluster. These are Broadcast Variables and </a:t>
             </a:r>
             <a:r>
               <a:rPr lang="en-GB" sz="1600" dirty="0" smtClean="0"/>
-              <a:t>foreach</a:t>
-            </a:r>
-            <a:endParaRPr lang="en-GB" sz="1600" dirty="0"/>
-          </a:p>
-          <a:p>
-            <a:endParaRPr lang="en-GB" sz="1600" dirty="0"/>
+              <a:t>Accumulators</a:t>
+            </a:r>
           </a:p>
           <a:p>
             <a:pPr lvl="1">
               <a:buFont typeface="Wingdings" panose="05000000000000000000" pitchFamily="2" charset="2"/>
               <a:buChar char="Ø"/>
             </a:pPr>
-            <a:endParaRPr lang="en-GB" sz="1400" dirty="0" smtClean="0"/>
+            <a:r>
+              <a:rPr lang="en-GB" sz="1400" b="1" i="1" dirty="0" smtClean="0"/>
+              <a:t>broadcast </a:t>
+            </a:r>
+            <a:r>
+              <a:rPr lang="en-GB" sz="1400" b="1" i="1" dirty="0"/>
+              <a:t>variables</a:t>
+            </a:r>
+            <a:r>
+              <a:rPr lang="en-GB" sz="1400" dirty="0"/>
+              <a:t> reference read-only data that needs to be available on all </a:t>
+            </a:r>
+            <a:r>
+              <a:rPr lang="en-GB" sz="1400" dirty="0" smtClean="0"/>
+              <a:t>nodes</a:t>
+            </a:r>
+          </a:p>
+          <a:p>
+            <a:pPr lvl="1">
+              <a:buFont typeface="Wingdings" panose="05000000000000000000" pitchFamily="2" charset="2"/>
+              <a:buChar char="Ø"/>
+            </a:pPr>
+            <a:r>
+              <a:rPr lang="en-GB" sz="1400" b="1" i="1" dirty="0" smtClean="0"/>
+              <a:t>accumulators</a:t>
+            </a:r>
+            <a:r>
+              <a:rPr lang="en-GB" sz="1400" dirty="0"/>
+              <a:t> can be used to program reductions in an </a:t>
+            </a:r>
+            <a:r>
+              <a:rPr lang="en-GB" sz="1400" dirty="0">
+                <a:hlinkClick r:id="rId12" tooltip="Imperative programming"/>
+              </a:rPr>
+              <a:t>imperative</a:t>
+            </a:r>
+            <a:r>
+              <a:rPr lang="en-GB" sz="1400" dirty="0"/>
+              <a:t> </a:t>
+            </a:r>
+            <a:r>
+              <a:rPr lang="en-GB" sz="1400" dirty="0" smtClean="0"/>
+              <a:t>style. </a:t>
+            </a:r>
+            <a:r>
+              <a:rPr lang="en-GB" sz="1400" dirty="0"/>
+              <a:t>They can be used to implement </a:t>
+            </a:r>
+            <a:r>
+              <a:rPr lang="en-GB" sz="1400" b="1" dirty="0"/>
+              <a:t>counters</a:t>
+            </a:r>
+            <a:r>
+              <a:rPr lang="en-GB" sz="1400" dirty="0"/>
+              <a:t> (as in MapReduce) or </a:t>
+            </a:r>
+            <a:r>
+              <a:rPr lang="en-GB" sz="1400" b="1" dirty="0"/>
+              <a:t>sums</a:t>
+            </a:r>
+            <a:endParaRPr lang="en-GB" sz="1400" b="1" dirty="0" smtClean="0"/>
           </a:p>
         </p:txBody>
       </p:sp>
     </p:spTree>
     <p:extLst>
       <p:ext uri="{BB962C8B-B14F-4D97-AF65-F5344CB8AC3E}">
-        <p14:creationId xmlns:p14="http://schemas.microsoft.com/office/powerpoint/2010/main" val="1474038152"/>
+        <p14:creationId xmlns:p14="http://schemas.microsoft.com/office/powerpoint/2010/main" val="712227284"/>
       </p:ext>
     </p:extLst>
   </p:cSld>
@@ -6355,7 +6387,7 @@
           <a:p>
             <a:r>
               <a:rPr lang="en-US" dirty="0" smtClean="0"/>
-              <a:t>Apache Spark - SQL</a:t>
+              <a:t>Apache Spark - Core</a:t>
             </a:r>
             <a:endParaRPr lang="en-US" dirty="0"/>
           </a:p>
@@ -6379,132 +6411,129 @@
           <a:lstStyle/>
           <a:p>
             <a:r>
-              <a:rPr lang="en-GB" sz="1600" dirty="0"/>
-              <a:t>Spark </a:t>
-            </a:r>
-            <a:r>
               <a:rPr lang="en-GB" sz="1600" dirty="0" smtClean="0"/>
-              <a:t>SQL </a:t>
-            </a:r>
-            <a:r>
-              <a:rPr lang="en-GB" sz="1600" dirty="0"/>
-              <a:t>is a component on top of Spark Core that introduces a new data abstraction called </a:t>
-            </a:r>
-            <a:r>
-              <a:rPr lang="en-GB" sz="1600" b="1" dirty="0" smtClean="0"/>
-              <a:t>DataFrames </a:t>
-            </a:r>
-            <a:r>
-              <a:rPr lang="en-GB" sz="1600" dirty="0"/>
-              <a:t>which provides support for </a:t>
-            </a:r>
+              <a:t>RDD supports two types of operations:</a:t>
+            </a:r>
+          </a:p>
+          <a:p>
+            <a:pPr lvl="1">
+              <a:buFont typeface="Wingdings" panose="05000000000000000000" pitchFamily="2" charset="2"/>
+              <a:buChar char="Ø"/>
+            </a:pPr>
+            <a:r>
+              <a:rPr lang="en-GB" sz="1400" dirty="0" smtClean="0"/>
+              <a:t>Transformation</a:t>
+            </a:r>
+          </a:p>
+          <a:p>
+            <a:pPr lvl="1">
+              <a:buFont typeface="Wingdings" panose="05000000000000000000" pitchFamily="2" charset="2"/>
+              <a:buChar char="Ø"/>
+            </a:pPr>
+            <a:r>
+              <a:rPr lang="en-GB" sz="1400" dirty="0" smtClean="0"/>
+              <a:t>Action</a:t>
+            </a:r>
+          </a:p>
+          <a:p>
             <a:r>
               <a:rPr lang="en-GB" sz="1600" b="1" dirty="0"/>
-              <a:t>structured</a:t>
-            </a:r>
-            <a:r>
-              <a:rPr lang="en-GB" sz="1600" dirty="0"/>
-              <a:t> and </a:t>
-            </a:r>
+              <a:t>Transformation:</a:t>
+            </a:r>
+            <a:r>
+              <a:rPr lang="en-GB" sz="1600" dirty="0"/>
+              <a:t> </a:t>
+            </a:r>
+            <a:r>
+              <a:rPr lang="en-GB" sz="1600" dirty="0">
+                <a:hlinkClick r:id="rId2"/>
+              </a:rPr>
+              <a:t>Transformations</a:t>
+            </a:r>
+            <a:r>
+              <a:rPr lang="en-GB" sz="1600" dirty="0"/>
+              <a:t> don't return a single value, they return a new RDD. Nothing gets evaluated when you call a Transformation function, it just takes an RDD and return a new </a:t>
+            </a:r>
+            <a:r>
+              <a:rPr lang="en-GB" sz="1600" dirty="0" smtClean="0"/>
+              <a:t>RDD</a:t>
+            </a:r>
+            <a:endParaRPr lang="en-GB" sz="1600" dirty="0"/>
+          </a:p>
+          <a:p>
+            <a:r>
+              <a:rPr lang="en-GB" sz="1600" dirty="0"/>
+              <a:t>Some of the Transformation functions are map, filter, flatMap, groupByKey, reduceByKey, aggregateByKey, pipe, and </a:t>
+            </a:r>
+            <a:r>
+              <a:rPr lang="en-GB" sz="1600" dirty="0" smtClean="0"/>
+              <a:t>coalesce</a:t>
+            </a:r>
+          </a:p>
+          <a:p>
             <a:r>
               <a:rPr lang="en-GB" sz="1600" b="1" dirty="0"/>
-              <a:t>semi-structured </a:t>
-            </a:r>
-            <a:r>
-              <a:rPr lang="en-GB" sz="1600" b="1" dirty="0" smtClean="0"/>
-              <a:t>data</a:t>
-            </a:r>
-          </a:p>
-          <a:p>
-            <a:r>
-              <a:rPr lang="en-GB" sz="1600" dirty="0"/>
-              <a:t>Spark SQL provides a </a:t>
+              <a:t>Action:</a:t>
+            </a:r>
+            <a:r>
+              <a:rPr lang="en-GB" sz="1600" dirty="0"/>
+              <a:t> </a:t>
             </a:r>
             <a:r>
               <a:rPr lang="en-GB" sz="1600" dirty="0">
-                <a:hlinkClick r:id="rId2" tooltip="Domain-specific language"/>
+                <a:hlinkClick r:id="rId3"/>
               </a:rPr>
-              <a:t>domain-specific language</a:t>
-            </a:r>
-            <a:r>
-              <a:rPr lang="en-GB" sz="1600" dirty="0"/>
-              <a:t> to manipulate DataFrames in </a:t>
-            </a:r>
-            <a:r>
-              <a:rPr lang="en-GB" sz="1600" dirty="0">
-                <a:hlinkClick r:id="rId3" tooltip="Scala (programming language)"/>
+              <a:t>Action</a:t>
+            </a:r>
+            <a:r>
+              <a:rPr lang="en-GB" sz="1600" dirty="0"/>
+              <a:t> operation evaluates and </a:t>
+            </a:r>
+            <a:r>
+              <a:rPr lang="en-GB" sz="1600" b="1" dirty="0">
+                <a:solidFill>
+                  <a:srgbClr val="00B050"/>
+                </a:solidFill>
               </a:rPr>
-              <a:t>Scala</a:t>
-            </a:r>
-            <a:r>
-              <a:rPr lang="en-GB" sz="1600" dirty="0"/>
-              <a:t>, </a:t>
-            </a:r>
-            <a:r>
-              <a:rPr lang="en-GB" sz="1600" dirty="0">
-                <a:hlinkClick r:id="rId4" tooltip="Java (programming language)"/>
-              </a:rPr>
-              <a:t>Java</a:t>
-            </a:r>
-            <a:r>
-              <a:rPr lang="en-GB" sz="1600" dirty="0"/>
-              <a:t>, or </a:t>
-            </a:r>
-            <a:r>
-              <a:rPr lang="en-GB" sz="1600" dirty="0" smtClean="0">
-                <a:hlinkClick r:id="rId5" tooltip="Python (programming language)"/>
-              </a:rPr>
-              <a:t>Python</a:t>
-            </a:r>
-            <a:endParaRPr lang="en-GB" sz="1600" dirty="0" smtClean="0"/>
-          </a:p>
-          <a:p>
-            <a:r>
-              <a:rPr lang="en-GB" sz="1600" dirty="0"/>
-              <a:t>It also provides SQL language support, with </a:t>
-            </a:r>
-            <a:r>
-              <a:rPr lang="en-GB" sz="1600" dirty="0" smtClean="0">
-                <a:hlinkClick r:id="rId6" tooltip="Command-line interface"/>
-              </a:rPr>
-              <a:t>command-line interfaces</a:t>
-            </a:r>
-            <a:r>
-              <a:rPr lang="en-GB" sz="1600" dirty="0"/>
-              <a:t> </a:t>
+              <a:t>returns a new value</a:t>
+            </a:r>
+            <a:r>
+              <a:rPr lang="en-GB" sz="1600" dirty="0"/>
+              <a:t>. When an Action function is called on a RDD object, all the data processing queries are computed at that time and the result value is </a:t>
             </a:r>
             <a:r>
               <a:rPr lang="en-GB" sz="1600" dirty="0" smtClean="0"/>
-              <a:t>and </a:t>
-            </a:r>
-            <a:r>
-              <a:rPr lang="en-GB" sz="1600" dirty="0" smtClean="0">
-                <a:hlinkClick r:id="rId7" tooltip="Open Database Connectivity"/>
-              </a:rPr>
-              <a:t>ODBC</a:t>
+              <a:t>returned</a:t>
+            </a:r>
+            <a:endParaRPr lang="en-GB" sz="1600" dirty="0"/>
+          </a:p>
+          <a:p>
+            <a:r>
+              <a:rPr lang="en-GB" sz="1600" dirty="0"/>
+              <a:t>Some of the Action operations are reduce, collect, count, first, take, countByKey, and </a:t>
             </a:r>
             <a:r>
               <a:rPr lang="en-GB" sz="1600" dirty="0" smtClean="0"/>
-              <a:t>/</a:t>
-            </a:r>
-            <a:r>
-              <a:rPr lang="en-GB" sz="1600" dirty="0" smtClean="0">
-                <a:hlinkClick r:id="rId8" tooltip="Java Database Connectivity"/>
-              </a:rPr>
-              <a:t>JDBC</a:t>
-            </a:r>
-            <a:r>
-              <a:rPr lang="en-GB" sz="1600" dirty="0"/>
-              <a:t> server</a:t>
-            </a:r>
-            <a:endParaRPr lang="en-GB" sz="1600" b="1" dirty="0"/>
+              <a:t>foreach</a:t>
+            </a:r>
+            <a:endParaRPr lang="en-GB" sz="1600" dirty="0"/>
+          </a:p>
+          <a:p>
+            <a:endParaRPr lang="en-GB" sz="1600" dirty="0"/>
+          </a:p>
+          <a:p>
+            <a:pPr lvl="1">
+              <a:buFont typeface="Wingdings" panose="05000000000000000000" pitchFamily="2" charset="2"/>
+              <a:buChar char="Ø"/>
+            </a:pPr>
+            <a:endParaRPr lang="en-GB" sz="1400" dirty="0" smtClean="0"/>
           </a:p>
         </p:txBody>
       </p:sp>
     </p:spTree>
     <p:extLst>
       <p:ext uri="{BB962C8B-B14F-4D97-AF65-F5344CB8AC3E}">
-        <p14:creationId xmlns:p14="http://schemas.microsoft.com/office/powerpoint/2010/main" val="4239394494"/>
+        <p14:creationId xmlns:p14="http://schemas.microsoft.com/office/powerpoint/2010/main" val="1474038152"/>
       </p:ext>
     </p:extLst>
   </p:cSld>
@@ -6557,7 +6586,7 @@
           <a:p>
             <a:r>
               <a:rPr lang="en-US" dirty="0" smtClean="0"/>
-              <a:t>Apache Spark - Streaming</a:t>
+              <a:t>Apache Spark - SQL</a:t>
             </a:r>
             <a:endParaRPr lang="en-US" dirty="0"/>
           </a:p>
@@ -6582,30 +6611,35 @@
           <a:p>
             <a:r>
               <a:rPr lang="en-GB" sz="1600" dirty="0"/>
-              <a:t>Spark Streaming leverages Spark Core's fast scheduling capability to perform </a:t>
-            </a:r>
-            <a:r>
-              <a:rPr lang="en-GB" sz="1600" u="sng" dirty="0">
-                <a:hlinkClick r:id="rId2" tooltip="Event stream processing"/>
-              </a:rPr>
-              <a:t>streaming </a:t>
-            </a:r>
-            <a:r>
-              <a:rPr lang="en-GB" sz="1600" u="sng" dirty="0" smtClean="0">
-                <a:hlinkClick r:id="rId2" tooltip="Event stream processing"/>
-              </a:rPr>
-              <a:t>analytics</a:t>
-            </a:r>
-            <a:endParaRPr lang="en-GB" sz="1600" u="sng" dirty="0" smtClean="0"/>
-          </a:p>
-          <a:p>
-            <a:r>
-              <a:rPr lang="en-GB" sz="1600" dirty="0"/>
-              <a:t>It ingests data in mini-batches and performs RDD transformations on those </a:t>
+              <a:t>Spark </a:t>
+            </a:r>
+            <a:r>
+              <a:rPr lang="en-GB" sz="1600" dirty="0" smtClean="0"/>
+              <a:t>SQL </a:t>
+            </a:r>
+            <a:r>
+              <a:rPr lang="en-GB" sz="1600" dirty="0"/>
+              <a:t>is a component on top of Spark Core that introduces a new data abstraction called </a:t>
+            </a:r>
+            <a:r>
+              <a:rPr lang="en-GB" sz="1600" b="1" dirty="0" smtClean="0"/>
+              <a:t>DataFrames </a:t>
+            </a:r>
+            <a:r>
+              <a:rPr lang="en-GB" sz="1600" dirty="0"/>
+              <a:t>which provides support for </a:t>
             </a:r>
             <a:r>
               <a:rPr lang="en-GB" sz="1600" b="1" dirty="0"/>
-              <a:t>mini-batches of </a:t>
+              <a:t>structured</a:t>
+            </a:r>
+            <a:r>
+              <a:rPr lang="en-GB" sz="1600" dirty="0"/>
+              <a:t> and </a:t>
+            </a:r>
+            <a:r>
+              <a:rPr lang="en-GB" sz="1600" b="1" dirty="0"/>
+              <a:t>semi-structured </a:t>
             </a:r>
             <a:r>
               <a:rPr lang="en-GB" sz="1600" b="1" dirty="0" smtClean="0"/>
@@ -6615,19 +6649,85 @@
           <a:p>
             <a:r>
               <a:rPr lang="en-GB" sz="1600" dirty="0"/>
-              <a:t>This design enables the same set of application code written for </a:t>
-            </a:r>
-            <a:r>
-              <a:rPr lang="en-GB" sz="1600" b="1" dirty="0"/>
-              <a:t>batch analytics</a:t>
-            </a:r>
-            <a:r>
-              <a:rPr lang="en-GB" sz="1600" dirty="0"/>
-              <a:t> to be used in streaming analytics, on a single engine</a:t>
+              <a:t>Spark SQL provides a </a:t>
+            </a:r>
+            <a:r>
+              <a:rPr lang="en-GB" sz="1600" dirty="0">
+                <a:hlinkClick r:id="rId2" tooltip="Domain-specific language"/>
+              </a:rPr>
+              <a:t>domain-specific language</a:t>
+            </a:r>
+            <a:r>
+              <a:rPr lang="en-GB" sz="1600" dirty="0"/>
+              <a:t> to manipulate DataFrames in </a:t>
+            </a:r>
+            <a:r>
+              <a:rPr lang="en-GB" sz="1600" dirty="0">
+                <a:hlinkClick r:id="rId3" tooltip="Scala (programming language)"/>
+              </a:rPr>
+              <a:t>Scala</a:t>
+            </a:r>
+            <a:r>
+              <a:rPr lang="en-GB" sz="1600" dirty="0"/>
+              <a:t>, </a:t>
+            </a:r>
+            <a:r>
+              <a:rPr lang="en-GB" sz="1600" dirty="0">
+                <a:hlinkClick r:id="rId4" tooltip="Java (programming language)"/>
+              </a:rPr>
+              <a:t>Java</a:t>
+            </a:r>
+            <a:r>
+              <a:rPr lang="en-GB" sz="1600" dirty="0"/>
+              <a:t>, or </a:t>
+            </a:r>
+            <a:r>
+              <a:rPr lang="en-GB" sz="1600" dirty="0" smtClean="0">
+                <a:hlinkClick r:id="rId5" tooltip="Python (programming language)"/>
+              </a:rPr>
+              <a:t>Python</a:t>
             </a:r>
             <a:endParaRPr lang="en-GB" sz="1600" dirty="0" smtClean="0"/>
           </a:p>
           <a:p>
+            <a:r>
+              <a:rPr lang="en-GB" sz="1600" dirty="0"/>
+              <a:t>It also provides SQL language support, with </a:t>
+            </a:r>
+            <a:r>
+              <a:rPr lang="en-GB" sz="1600" dirty="0" smtClean="0">
+                <a:hlinkClick r:id="rId6" tooltip="Command-line interface"/>
+              </a:rPr>
+              <a:t>command-line interfaces</a:t>
+            </a:r>
+            <a:r>
+              <a:rPr lang="en-GB" sz="1600" dirty="0"/>
+              <a:t> </a:t>
+            </a:r>
+            <a:r>
+              <a:rPr lang="en-GB" sz="1600" dirty="0" smtClean="0"/>
+              <a:t>and </a:t>
+            </a:r>
+            <a:r>
+              <a:rPr lang="en-GB" sz="1600" dirty="0" smtClean="0">
+                <a:hlinkClick r:id="rId7" tooltip="Open Database Connectivity"/>
+              </a:rPr>
+              <a:t>ODBC</a:t>
+            </a:r>
+            <a:r>
+              <a:rPr lang="en-GB" sz="1600" dirty="0" smtClean="0"/>
+              <a:t>/</a:t>
+            </a:r>
+            <a:r>
+              <a:rPr lang="en-GB" sz="1600" dirty="0" smtClean="0">
+                <a:hlinkClick r:id="rId8" tooltip="Java Database Connectivity"/>
+              </a:rPr>
+              <a:t>JDBC</a:t>
+            </a:r>
+            <a:r>
+              <a:rPr lang="en-GB" sz="1600" dirty="0"/>
+              <a:t> server</a:t>
+            </a:r>
             <a:endParaRPr lang="en-GB" sz="1600" b="1" dirty="0"/>
           </a:p>
         </p:txBody>
@@ -6635,7 +6735,7 @@
     </p:spTree>
     <p:extLst>
       <p:ext uri="{BB962C8B-B14F-4D97-AF65-F5344CB8AC3E}">
-        <p14:creationId xmlns:p14="http://schemas.microsoft.com/office/powerpoint/2010/main" val="3935547205"/>
+        <p14:creationId xmlns:p14="http://schemas.microsoft.com/office/powerpoint/2010/main" val="4239394494"/>
       </p:ext>
     </p:extLst>
   </p:cSld>
@@ -6688,7 +6788,7 @@
           <a:p>
             <a:r>
               <a:rPr lang="en-US" dirty="0" smtClean="0"/>
-              <a:t>Apache Spark - MLlib</a:t>
+              <a:t>Apache Spark - Streaming</a:t>
             </a:r>
             <a:endParaRPr lang="en-US" dirty="0"/>
           </a:p>
@@ -6712,63 +6812,53 @@
           <a:lstStyle/>
           <a:p>
             <a:r>
-              <a:rPr lang="en-GB" sz="1600" dirty="0" smtClean="0"/>
-              <a:t>MLlib – Machine Language Library</a:t>
-            </a:r>
-          </a:p>
-          <a:p>
-            <a:r>
-              <a:rPr lang="en-GB" sz="1600" dirty="0"/>
-              <a:t>Spark MLlib is a </a:t>
-            </a:r>
-            <a:r>
-              <a:rPr lang="en-GB" sz="1600" dirty="0">
-                <a:hlinkClick r:id="rId2" tooltip="Distributed computing"/>
+              <a:rPr lang="en-GB" sz="1600" dirty="0"/>
+              <a:t>Spark Streaming leverages Spark Core's fast scheduling capability to perform </a:t>
+            </a:r>
+            <a:r>
+              <a:rPr lang="en-GB" sz="1600" u="sng" dirty="0">
+                <a:hlinkClick r:id="rId2" tooltip="Event stream processing"/>
               </a:rPr>
-              <a:t>distributed</a:t>
-            </a:r>
-            <a:r>
-              <a:rPr lang="en-GB" sz="1600" dirty="0"/>
-              <a:t> machine learning framework on top of Spark Core that, due in large part of the distributed memory-based Spark architecture, is as much as nine times as fast as the disk-based implementation used by </a:t>
-            </a:r>
-            <a:r>
-              <a:rPr lang="en-GB" sz="1600" dirty="0">
-                <a:hlinkClick r:id="rId3" tooltip="Apache Mahout"/>
+              <a:t>streaming </a:t>
+            </a:r>
+            <a:r>
+              <a:rPr lang="en-GB" sz="1600" u="sng" dirty="0" smtClean="0">
+                <a:hlinkClick r:id="rId2" tooltip="Event stream processing"/>
               </a:rPr>
-              <a:t>Apache </a:t>
-            </a:r>
-            <a:r>
-              <a:rPr lang="en-GB" sz="1600" dirty="0" smtClean="0">
-                <a:hlinkClick r:id="rId3" tooltip="Apache Mahout"/>
-              </a:rPr>
-              <a:t>Mahout</a:t>
-            </a:r>
-            <a:r>
-              <a:rPr lang="en-GB" sz="1600" dirty="0" smtClean="0"/>
-              <a:t> and </a:t>
-            </a:r>
-            <a:r>
-              <a:rPr lang="en-GB" sz="1600" dirty="0">
-                <a:hlinkClick r:id="rId4" tooltip="Scale (computing)"/>
-              </a:rPr>
-              <a:t>scales</a:t>
-            </a:r>
-            <a:r>
-              <a:rPr lang="en-GB" sz="1600" dirty="0"/>
-              <a:t> better than </a:t>
-            </a:r>
-            <a:r>
-              <a:rPr lang="en-GB" sz="1600" u="sng" dirty="0" err="1">
-                <a:hlinkClick r:id="rId5" tooltip="Vowpal Wabbit"/>
-              </a:rPr>
-              <a:t>Vowpal</a:t>
-            </a:r>
-            <a:r>
-              <a:rPr lang="en-GB" sz="1600" u="sng" dirty="0">
-                <a:hlinkClick r:id="rId5" tooltip="Vowpal Wabbit"/>
-              </a:rPr>
-              <a:t> Wabbit</a:t>
-            </a:r>
+              <a:t>analytics</a:t>
+            </a:r>
+            <a:endParaRPr lang="en-GB" sz="1600" u="sng" dirty="0" smtClean="0"/>
+          </a:p>
+          <a:p>
+            <a:r>
+              <a:rPr lang="en-GB" sz="1600" dirty="0"/>
+              <a:t>It ingests data in mini-batches and performs RDD transformations on those </a:t>
+            </a:r>
+            <a:r>
+              <a:rPr lang="en-GB" sz="1600" b="1" dirty="0"/>
+              <a:t>mini-batches of </a:t>
+            </a:r>
+            <a:r>
+              <a:rPr lang="en-GB" sz="1600" b="1" dirty="0" smtClean="0"/>
+              <a:t>data</a:t>
+            </a:r>
+          </a:p>
+          <a:p>
+            <a:r>
+              <a:rPr lang="en-GB" sz="1600" dirty="0"/>
+              <a:t>This design enables the same set of application code written for </a:t>
+            </a:r>
+            <a:r>
+              <a:rPr lang="en-GB" sz="1600" b="1" dirty="0"/>
+              <a:t>batch analytics</a:t>
+            </a:r>
+            <a:r>
+              <a:rPr lang="en-GB" sz="1600" dirty="0"/>
+              <a:t> to be used in streaming analytics, on a single engine</a:t>
+            </a:r>
+            <a:endParaRPr lang="en-GB" sz="1600" dirty="0" smtClean="0"/>
+          </a:p>
+          <a:p>
             <a:endParaRPr lang="en-GB" sz="1600" b="1" dirty="0"/>
           </a:p>
         </p:txBody>
@@ -6776,7 +6866,7 @@
     </p:spTree>
     <p:extLst>
       <p:ext uri="{BB962C8B-B14F-4D97-AF65-F5344CB8AC3E}">
-        <p14:creationId xmlns:p14="http://schemas.microsoft.com/office/powerpoint/2010/main" val="4025426119"/>
+        <p14:creationId xmlns:p14="http://schemas.microsoft.com/office/powerpoint/2010/main" val="3935547205"/>
       </p:ext>
     </p:extLst>
   </p:cSld>
@@ -6829,6 +6919,147 @@
           <a:p>
             <a:r>
               <a:rPr lang="en-US" dirty="0" smtClean="0"/>
+              <a:t>Apache Spark - MLlib</a:t>
+            </a:r>
+            <a:endParaRPr lang="en-US" dirty="0"/>
+          </a:p>
+        </p:txBody>
+      </p:sp>
+      <p:sp>
+        <p:nvSpPr>
+          <p:cNvPr id="3" name="Content Placeholder 2"/>
+          <p:cNvSpPr>
+            <a:spLocks noGrp="1"/>
+          </p:cNvSpPr>
+          <p:nvPr>
+            <p:ph idx="1"/>
+          </p:nvPr>
+        </p:nvSpPr>
+        <p:spPr/>
+        <p:txBody>
+          <a:bodyPr>
+            <a:normAutofit/>
+          </a:bodyPr>
+          <a:lstStyle/>
+          <a:p>
+            <a:r>
+              <a:rPr lang="en-GB" sz="1600" dirty="0" smtClean="0"/>
+              <a:t>MLlib – Machine Language Library</a:t>
+            </a:r>
+          </a:p>
+          <a:p>
+            <a:r>
+              <a:rPr lang="en-GB" sz="1600" dirty="0"/>
+              <a:t>Spark MLlib is a </a:t>
+            </a:r>
+            <a:r>
+              <a:rPr lang="en-GB" sz="1600" dirty="0">
+                <a:hlinkClick r:id="rId2" tooltip="Distributed computing"/>
+              </a:rPr>
+              <a:t>distributed</a:t>
+            </a:r>
+            <a:r>
+              <a:rPr lang="en-GB" sz="1600" dirty="0"/>
+              <a:t> machine learning framework on top of Spark Core that, due in large part of the distributed memory-based Spark architecture, is as much as nine times as fast as the disk-based implementation used by </a:t>
+            </a:r>
+            <a:r>
+              <a:rPr lang="en-GB" sz="1600" dirty="0">
+                <a:hlinkClick r:id="rId3" tooltip="Apache Mahout"/>
+              </a:rPr>
+              <a:t>Apache </a:t>
+            </a:r>
+            <a:r>
+              <a:rPr lang="en-GB" sz="1600" dirty="0" smtClean="0">
+                <a:hlinkClick r:id="rId3" tooltip="Apache Mahout"/>
+              </a:rPr>
+              <a:t>Mahout</a:t>
+            </a:r>
+            <a:r>
+              <a:rPr lang="en-GB" sz="1600" dirty="0" smtClean="0"/>
+              <a:t> and </a:t>
+            </a:r>
+            <a:r>
+              <a:rPr lang="en-GB" sz="1600" dirty="0">
+                <a:hlinkClick r:id="rId4" tooltip="Scale (computing)"/>
+              </a:rPr>
+              <a:t>scales</a:t>
+            </a:r>
+            <a:r>
+              <a:rPr lang="en-GB" sz="1600" dirty="0"/>
+              <a:t> better than </a:t>
+            </a:r>
+            <a:r>
+              <a:rPr lang="en-GB" sz="1600" u="sng" dirty="0" err="1">
+                <a:hlinkClick r:id="rId5" tooltip="Vowpal Wabbit"/>
+              </a:rPr>
+              <a:t>Vowpal</a:t>
+            </a:r>
+            <a:r>
+              <a:rPr lang="en-GB" sz="1600" u="sng" dirty="0">
+                <a:hlinkClick r:id="rId5" tooltip="Vowpal Wabbit"/>
+              </a:rPr>
+              <a:t> Wabbit</a:t>
+            </a:r>
+            <a:endParaRPr lang="en-GB" sz="1600" b="1" dirty="0"/>
+          </a:p>
+        </p:txBody>
+      </p:sp>
+    </p:spTree>
+    <p:extLst>
+      <p:ext uri="{BB962C8B-B14F-4D97-AF65-F5344CB8AC3E}">
+        <p14:creationId xmlns:p14="http://schemas.microsoft.com/office/powerpoint/2010/main" val="4025426119"/>
+      </p:ext>
+    </p:extLst>
+  </p:cSld>
+  <p:clrMapOvr>
+    <a:masterClrMapping/>
+  </p:clrMapOvr>
+  <p:timing>
+    <p:tnLst>
+      <p:par>
+        <p:cTn id="1" dur="indefinite" restart="never" nodeType="tmRoot"/>
+      </p:par>
+    </p:tnLst>
+  </p:timing>
+</p:sld>
+</file>
+
+<file path=ppt/slides/slide27.xml><?xml version="1.0" encoding="utf-8"?>
+<p:sld xmlns:a="http://schemas.openxmlformats.org/drawingml/2006/main" xmlns:r="http://schemas.openxmlformats.org/officeDocument/2006/relationships" xmlns:p="http://schemas.openxmlformats.org/presentationml/2006/main">
+  <p:cSld>
+    <p:spTree>
+      <p:nvGrpSpPr>
+        <p:cNvPr id="1" name=""/>
+        <p:cNvGrpSpPr/>
+        <p:nvPr/>
+      </p:nvGrpSpPr>
+      <p:grpSpPr>
+        <a:xfrm>
+          <a:off x="0" y="0"/>
+          <a:ext cx="0" cy="0"/>
+          <a:chOff x="0" y="0"/>
+          <a:chExt cx="0" cy="0"/>
+        </a:xfrm>
+      </p:grpSpPr>
+      <p:sp>
+        <p:nvSpPr>
+          <p:cNvPr id="2" name="Title 1"/>
+          <p:cNvSpPr>
+            <a:spLocks noGrp="1"/>
+          </p:cNvSpPr>
+          <p:nvPr>
+            <p:ph type="title"/>
+          </p:nvPr>
+        </p:nvSpPr>
+        <p:spPr/>
+        <p:txBody>
+          <a:bodyPr>
+            <a:normAutofit/>
+          </a:bodyPr>
+          <a:lstStyle/>
+          <a:p>
+            <a:r>
+              <a:rPr lang="en-US" dirty="0" smtClean="0"/>
               <a:t>Apache Spark - GraphX</a:t>
             </a:r>
             <a:endParaRPr lang="en-US" dirty="0"/>
@@ -6950,7 +7181,7 @@
 </p:sld>
 </file>
 
-<file path=ppt/slides/slide27.xml><?xml version="1.0" encoding="utf-8"?>
+<file path=ppt/slides/slide28.xml><?xml version="1.0" encoding="utf-8"?>
 <p:sld xmlns:a="http://schemas.openxmlformats.org/drawingml/2006/main" xmlns:r="http://schemas.openxmlformats.org/officeDocument/2006/relationships" xmlns:p="http://schemas.openxmlformats.org/presentationml/2006/main">
   <p:cSld>
     <p:spTree>
@@ -7171,129 +7402,6 @@
 </p:sld>
 </file>
 
-<file path=ppt/slides/slide28.xml><?xml version="1.0" encoding="utf-8"?>
-<p:sld xmlns:a="http://schemas.openxmlformats.org/drawingml/2006/main" xmlns:r="http://schemas.openxmlformats.org/officeDocument/2006/relationships" xmlns:p="http://schemas.openxmlformats.org/presentationml/2006/main">
-  <p:cSld>
-    <p:spTree>
-      <p:nvGrpSpPr>
-        <p:cNvPr id="1" name=""/>
-        <p:cNvGrpSpPr/>
-        <p:nvPr/>
-      </p:nvGrpSpPr>
-      <p:grpSpPr>
-        <a:xfrm>
-          <a:off x="0" y="0"/>
-          <a:ext cx="0" cy="0"/>
-          <a:chOff x="0" y="0"/>
-          <a:chExt cx="0" cy="0"/>
-        </a:xfrm>
-      </p:grpSpPr>
-      <p:sp>
-        <p:nvSpPr>
-          <p:cNvPr id="2" name="Title 1"/>
-          <p:cNvSpPr>
-            <a:spLocks noGrp="1"/>
-          </p:cNvSpPr>
-          <p:nvPr>
-            <p:ph type="title"/>
-          </p:nvPr>
-        </p:nvSpPr>
-        <p:spPr/>
-        <p:txBody>
-          <a:bodyPr>
-            <a:normAutofit/>
-          </a:bodyPr>
-          <a:lstStyle/>
-          <a:p>
-            <a:r>
-              <a:rPr lang="en-US" dirty="0" smtClean="0"/>
-              <a:t>Apache Spark - Interact</a:t>
-            </a:r>
-            <a:endParaRPr lang="en-US" dirty="0"/>
-          </a:p>
-        </p:txBody>
-      </p:sp>
-      <p:sp>
-        <p:nvSpPr>
-          <p:cNvPr id="3" name="Content Placeholder 2"/>
-          <p:cNvSpPr>
-            <a:spLocks noGrp="1"/>
-          </p:cNvSpPr>
-          <p:nvPr>
-            <p:ph idx="1"/>
-          </p:nvPr>
-        </p:nvSpPr>
-        <p:spPr/>
-        <p:txBody>
-          <a:bodyPr>
-            <a:normAutofit/>
-          </a:bodyPr>
-          <a:lstStyle/>
-          <a:p>
-            <a:r>
-              <a:rPr lang="en-GB" sz="1600" dirty="0"/>
-              <a:t>Once Spark is up and running, you can connect to it using the Spark shell for interactive data analysis. Spark Shell is available in both Scala and Python languages. Java doesn’t support an interactive shell yet, so this feature is currently not available in </a:t>
-            </a:r>
-            <a:r>
-              <a:rPr lang="en-GB" sz="1600" dirty="0" smtClean="0"/>
-              <a:t>Java</a:t>
-            </a:r>
-          </a:p>
-          <a:p>
-            <a:r>
-              <a:rPr lang="en-GB" sz="1600" dirty="0"/>
-              <a:t>You use the commands </a:t>
-            </a:r>
-            <a:r>
-              <a:rPr lang="en-GB" sz="1600" b="1" dirty="0"/>
-              <a:t>spark-shell.cmd</a:t>
-            </a:r>
-            <a:r>
-              <a:rPr lang="en-GB" sz="1600" dirty="0"/>
-              <a:t> and </a:t>
-            </a:r>
-            <a:r>
-              <a:rPr lang="en-GB" sz="1600" b="1" dirty="0"/>
-              <a:t>pyspark.cmd</a:t>
-            </a:r>
-            <a:r>
-              <a:rPr lang="en-GB" sz="1600" dirty="0"/>
-              <a:t> to run Spark Shell using Scala and Python </a:t>
-            </a:r>
-            <a:r>
-              <a:rPr lang="en-GB" sz="1600" dirty="0" smtClean="0"/>
-              <a:t>respectively</a:t>
-            </a:r>
-          </a:p>
-          <a:p>
-            <a:r>
-              <a:rPr lang="en-US" sz="1600" dirty="0"/>
-              <a:t>http://localhost:4040</a:t>
-            </a:r>
-            <a:endParaRPr lang="en-GB" sz="1600" b="1" dirty="0"/>
-          </a:p>
-        </p:txBody>
-      </p:sp>
-    </p:spTree>
-    <p:extLst>
-      <p:ext uri="{BB962C8B-B14F-4D97-AF65-F5344CB8AC3E}">
-        <p14:creationId xmlns:p14="http://schemas.microsoft.com/office/powerpoint/2010/main" val="2532294725"/>
-      </p:ext>
-    </p:extLst>
-  </p:cSld>
-  <p:clrMapOvr>
-    <a:masterClrMapping/>
-  </p:clrMapOvr>
-  <p:timing>
-    <p:tnLst>
-      <p:par>
-        <p:cTn id="1" dur="indefinite" restart="never" nodeType="tmRoot"/>
-      </p:par>
-    </p:tnLst>
-  </p:timing>
-</p:sld>
-</file>
-
 <file path=ppt/slides/slide29.xml><?xml version="1.0" encoding="utf-8"?>
 <p:sld xmlns:a="http://schemas.openxmlformats.org/drawingml/2006/main" xmlns:r="http://schemas.openxmlformats.org/officeDocument/2006/relationships" xmlns:p="http://schemas.openxmlformats.org/presentationml/2006/main">
   <p:cSld>
@@ -7323,214 +7431,84 @@
         </p:nvSpPr>
         <p:spPr/>
         <p:txBody>
-          <a:bodyPr/>
-          <a:lstStyle/>
-          <a:p>
-            <a:r>
-              <a:rPr lang="en-US" dirty="0" smtClean="0"/>
-              <a:t>References – P1</a:t>
-            </a:r>
-            <a:endParaRPr lang="en-US" dirty="0"/>
-          </a:p>
-        </p:txBody>
-      </p:sp>
-      <p:sp>
-        <p:nvSpPr>
-          <p:cNvPr id="3" name="Content Placeholder 2"/>
-          <p:cNvSpPr>
-            <a:spLocks noGrp="1"/>
-          </p:cNvSpPr>
-          <p:nvPr>
-            <p:ph idx="1"/>
-          </p:nvPr>
-        </p:nvSpPr>
-        <p:spPr/>
-        <p:txBody>
           <a:bodyPr>
             <a:normAutofit/>
           </a:bodyPr>
           <a:lstStyle/>
           <a:p>
             <a:r>
-              <a:rPr lang="en-US" sz="1600" dirty="0">
-                <a:hlinkClick r:id="rId2"/>
-              </a:rPr>
-              <a:t>https://</a:t>
-            </a:r>
-            <a:r>
-              <a:rPr lang="en-US" sz="1600" dirty="0" smtClean="0">
-                <a:hlinkClick r:id="rId2"/>
-              </a:rPr>
-              <a:t>www.linkedin.com/pulse/scala-question-2016-mark-makary?trk=pulse_spock-articles</a:t>
-            </a:r>
-            <a:endParaRPr lang="en-US" sz="1600" dirty="0" smtClean="0"/>
-          </a:p>
-          <a:p>
-            <a:r>
-              <a:rPr lang="en-US" sz="1600" dirty="0">
-                <a:hlinkClick r:id="rId3"/>
-              </a:rPr>
-              <a:t>http://spark.apache.org</a:t>
-            </a:r>
-            <a:r>
-              <a:rPr lang="en-US" sz="1600" dirty="0" smtClean="0">
-                <a:hlinkClick r:id="rId3"/>
-              </a:rPr>
-              <a:t>/</a:t>
-            </a:r>
-            <a:endParaRPr lang="en-US" sz="1600" dirty="0" smtClean="0"/>
-          </a:p>
-          <a:p>
-            <a:r>
-              <a:rPr lang="en-US" sz="1600" dirty="0">
-                <a:hlinkClick r:id="rId4"/>
-              </a:rPr>
-              <a:t>https://</a:t>
-            </a:r>
-            <a:r>
-              <a:rPr lang="en-US" sz="1600" dirty="0" smtClean="0">
-                <a:hlinkClick r:id="rId4"/>
-              </a:rPr>
-              <a:t>en.wikipedia.org/wiki/Apache_Spark</a:t>
-            </a:r>
-            <a:endParaRPr lang="en-US" sz="1600" dirty="0" smtClean="0"/>
-          </a:p>
-          <a:p>
-            <a:r>
-              <a:rPr lang="en-US" sz="1600" dirty="0">
-                <a:hlinkClick r:id="rId5"/>
-              </a:rPr>
-              <a:t>https://</a:t>
-            </a:r>
-            <a:r>
-              <a:rPr lang="en-US" sz="1600" dirty="0" smtClean="0">
-                <a:hlinkClick r:id="rId5"/>
-              </a:rPr>
-              <a:t>github.com/apache/spark</a:t>
-            </a:r>
-            <a:endParaRPr lang="en-US" sz="1600" dirty="0" smtClean="0"/>
-          </a:p>
-          <a:p>
-            <a:r>
-              <a:rPr lang="en-US" sz="1600" dirty="0">
-                <a:hlinkClick r:id="rId6"/>
-              </a:rPr>
-              <a:t>http://</a:t>
-            </a:r>
-            <a:r>
-              <a:rPr lang="en-US" sz="1600" dirty="0" smtClean="0">
-                <a:hlinkClick r:id="rId6"/>
-              </a:rPr>
-              <a:t>www.infoq.com/articles/apache-spark-introduction</a:t>
-            </a:r>
-            <a:endParaRPr lang="en-US" sz="1600" dirty="0" smtClean="0"/>
-          </a:p>
-          <a:p>
-            <a:r>
-              <a:rPr lang="en-US" sz="1600" dirty="0">
-                <a:hlinkClick r:id="rId7"/>
-              </a:rPr>
-              <a:t>http://bigdatauniversity.com</a:t>
-            </a:r>
-            <a:r>
-              <a:rPr lang="en-US" sz="1600" dirty="0" smtClean="0">
-                <a:hlinkClick r:id="rId7"/>
-              </a:rPr>
-              <a:t>/</a:t>
-            </a:r>
-            <a:endParaRPr lang="en-US" sz="1600" dirty="0" smtClean="0"/>
-          </a:p>
-          <a:p>
-            <a:r>
-              <a:rPr lang="en-US" sz="1600" dirty="0">
-                <a:hlinkClick r:id="rId8"/>
-              </a:rPr>
-              <a:t>http://www.forbes.com/sites/bernardmarr/2015/06/22/spark-or-hadoop-which-is-the-best-big-data-framework/#</a:t>
-            </a:r>
-            <a:r>
-              <a:rPr lang="en-US" sz="1600" dirty="0" smtClean="0">
-                <a:hlinkClick r:id="rId8"/>
-              </a:rPr>
-              <a:t>19a11e0f532c</a:t>
-            </a:r>
-            <a:endParaRPr lang="en-US" sz="1600" dirty="0" smtClean="0"/>
-          </a:p>
-          <a:p>
-            <a:r>
-              <a:rPr lang="en-US" sz="1600" dirty="0">
-                <a:hlinkClick r:id="rId9"/>
-              </a:rPr>
-              <a:t>http://bigdata.andreamostosi.name</a:t>
-            </a:r>
-            <a:r>
-              <a:rPr lang="en-US" sz="1600" dirty="0" smtClean="0">
-                <a:hlinkClick r:id="rId9"/>
-              </a:rPr>
-              <a:t>/</a:t>
-            </a:r>
-            <a:endParaRPr lang="en-US" sz="1600" dirty="0" smtClean="0"/>
-          </a:p>
-          <a:p>
-            <a:r>
-              <a:rPr lang="en-US" sz="1600" dirty="0">
-                <a:hlinkClick r:id="rId9"/>
-              </a:rPr>
-              <a:t>http://bigdata.andreamostosi.name</a:t>
-            </a:r>
-            <a:r>
-              <a:rPr lang="en-US" sz="1600" dirty="0" smtClean="0">
-                <a:hlinkClick r:id="rId9"/>
-              </a:rPr>
-              <a:t>/</a:t>
-            </a:r>
-            <a:endParaRPr lang="en-US" sz="1600" dirty="0" smtClean="0"/>
-          </a:p>
-          <a:p>
-            <a:r>
-              <a:rPr lang="en-US" sz="1600" dirty="0">
-                <a:hlinkClick r:id="rId10"/>
-              </a:rPr>
-              <a:t>https://</a:t>
-            </a:r>
-            <a:r>
-              <a:rPr lang="en-US" sz="1600" dirty="0" smtClean="0">
-                <a:hlinkClick r:id="rId10"/>
-              </a:rPr>
-              <a:t>github.com/alexandru/scala-best-practices/blob/master/sections/2-language-rules.md</a:t>
-            </a:r>
-            <a:endParaRPr lang="en-US" sz="1600" dirty="0" smtClean="0"/>
-          </a:p>
-          <a:p>
-            <a:r>
-              <a:rPr lang="en-US" sz="1600" dirty="0">
-                <a:hlinkClick r:id="rId11"/>
-              </a:rPr>
-              <a:t>http://www.alternatestack.com/development/mixin-class-compositions-in-scala</a:t>
-            </a:r>
-            <a:r>
-              <a:rPr lang="en-US" sz="1600" dirty="0" smtClean="0">
-                <a:hlinkClick r:id="rId11"/>
-              </a:rPr>
-              <a:t>/</a:t>
-            </a:r>
-            <a:endParaRPr lang="en-US" sz="1600" dirty="0" smtClean="0"/>
+              <a:rPr lang="en-US" dirty="0" smtClean="0"/>
+              <a:t>Apache Spark - Interact</a:t>
+            </a:r>
+            <a:endParaRPr lang="en-US" dirty="0"/>
+          </a:p>
+        </p:txBody>
+      </p:sp>
+      <p:sp>
+        <p:nvSpPr>
+          <p:cNvPr id="3" name="Content Placeholder 2"/>
+          <p:cNvSpPr>
+            <a:spLocks noGrp="1"/>
+          </p:cNvSpPr>
+          <p:nvPr>
+            <p:ph idx="1"/>
+          </p:nvPr>
+        </p:nvSpPr>
+        <p:spPr/>
+        <p:txBody>
+          <a:bodyPr>
+            <a:normAutofit/>
+          </a:bodyPr>
+          <a:lstStyle/>
+          <a:p>
+            <a:r>
+              <a:rPr lang="en-GB" sz="1600" dirty="0"/>
+              <a:t>Once Spark is up and running, you can connect to it using the Spark shell for interactive data analysis. Spark Shell is available in both Scala and Python languages. Java doesn’t support an interactive shell yet, so this feature is currently not available in </a:t>
+            </a:r>
+            <a:r>
+              <a:rPr lang="en-GB" sz="1600" dirty="0" smtClean="0"/>
+              <a:t>Java</a:t>
+            </a:r>
+          </a:p>
+          <a:p>
+            <a:r>
+              <a:rPr lang="en-GB" sz="1600" dirty="0"/>
+              <a:t>You use the commands </a:t>
+            </a:r>
+            <a:r>
+              <a:rPr lang="en-GB" sz="1600" b="1" dirty="0"/>
+              <a:t>spark-shell.cmd</a:t>
+            </a:r>
+            <a:r>
+              <a:rPr lang="en-GB" sz="1600" dirty="0"/>
+              <a:t> and </a:t>
+            </a:r>
+            <a:r>
+              <a:rPr lang="en-GB" sz="1600" b="1" dirty="0"/>
+              <a:t>pyspark.cmd</a:t>
+            </a:r>
+            <a:r>
+              <a:rPr lang="en-GB" sz="1600" dirty="0"/>
+              <a:t> to run Spark Shell using Scala and Python </a:t>
+            </a:r>
+            <a:r>
+              <a:rPr lang="en-GB" sz="1600" dirty="0" smtClean="0"/>
+              <a:t>respectively</a:t>
+            </a:r>
           </a:p>
           <a:p>
             <a:r>
               <a:rPr lang="en-US" sz="1600" dirty="0"/>
-              <a:t>https://intellipaat.com/interview-question/apache-spark-interview-questions/?utm_source=spark%20interview%20linkedin_SM&amp;utm_medium=posting&amp;utm_campaign=spark%20interview%20linkedin_SM%2Fposting</a:t>
-            </a:r>
-            <a:endParaRPr lang="en-US" sz="1600" dirty="0" smtClean="0"/>
-          </a:p>
-          <a:p>
-            <a:endParaRPr lang="en-US" sz="1600" dirty="0" smtClean="0"/>
+              <a:t>http://localhost:4040</a:t>
+            </a:r>
+            <a:endParaRPr lang="en-GB" sz="1600" b="1" dirty="0"/>
           </a:p>
         </p:txBody>
       </p:sp>
     </p:spTree>
     <p:extLst>
       <p:ext uri="{BB962C8B-B14F-4D97-AF65-F5344CB8AC3E}">
-        <p14:creationId xmlns:p14="http://schemas.microsoft.com/office/powerpoint/2010/main" val="924403351"/>
+        <p14:creationId xmlns:p14="http://schemas.microsoft.com/office/powerpoint/2010/main" val="2532294725"/>
       </p:ext>
     </p:extLst>
   </p:cSld>
@@ -7656,7 +7634,35 @@
             </a:r>
             <a:r>
               <a:rPr lang="en-GB" sz="1600" dirty="0"/>
-              <a:t>the functional paradigm and immutability -among other things- by design, makes Scala a winner on the scalability side</a:t>
+              <a:t>the functional paradigm and immutability -among other things- by design, makes Scala a winner on the scalability </a:t>
+            </a:r>
+            <a:r>
+              <a:rPr lang="en-GB" sz="1600" dirty="0" smtClean="0"/>
+              <a:t>side</a:t>
+            </a:r>
+          </a:p>
+          <a:p>
+            <a:r>
+              <a:rPr lang="en-GB" sz="1600" dirty="0" smtClean="0"/>
+              <a:t>High maintainability and productivity</a:t>
+            </a:r>
+          </a:p>
+          <a:p>
+            <a:r>
+              <a:rPr lang="en-GB" sz="1600" dirty="0" smtClean="0"/>
+              <a:t>High scalability</a:t>
+            </a:r>
+          </a:p>
+          <a:p>
+            <a:r>
+              <a:rPr lang="en-GB" sz="1600" dirty="0" smtClean="0"/>
+              <a:t>High testability</a:t>
+            </a:r>
+          </a:p>
+          <a:p>
+            <a:r>
+              <a:rPr lang="en-GB" sz="1600" dirty="0" smtClean="0"/>
+              <a:t>Provides features of concurrent programming</a:t>
             </a:r>
             <a:endParaRPr lang="en-GB" sz="1600" dirty="0" smtClean="0"/>
           </a:p>
@@ -7686,6 +7692,259 @@
 </file>
 
 <file path=ppt/slides/slide30.xml><?xml version="1.0" encoding="utf-8"?>
+<p:sld xmlns:a="http://schemas.openxmlformats.org/drawingml/2006/main" xmlns:r="http://schemas.openxmlformats.org/officeDocument/2006/relationships" xmlns:p="http://schemas.openxmlformats.org/presentationml/2006/main">
+  <p:cSld>
+    <p:spTree>
+      <p:nvGrpSpPr>
+        <p:cNvPr id="1" name=""/>
+        <p:cNvGrpSpPr/>
+        <p:nvPr/>
+      </p:nvGrpSpPr>
+      <p:grpSpPr>
+        <a:xfrm>
+          <a:off x="0" y="0"/>
+          <a:ext cx="0" cy="0"/>
+          <a:chOff x="0" y="0"/>
+          <a:chExt cx="0" cy="0"/>
+        </a:xfrm>
+      </p:grpSpPr>
+      <p:sp>
+        <p:nvSpPr>
+          <p:cNvPr id="2" name="Title 1"/>
+          <p:cNvSpPr>
+            <a:spLocks noGrp="1"/>
+          </p:cNvSpPr>
+          <p:nvPr>
+            <p:ph type="title"/>
+          </p:nvPr>
+        </p:nvSpPr>
+        <p:spPr/>
+        <p:txBody>
+          <a:bodyPr/>
+          <a:lstStyle/>
+          <a:p>
+            <a:r>
+              <a:rPr lang="en-US" dirty="0" smtClean="0"/>
+              <a:t>References – P1</a:t>
+            </a:r>
+            <a:endParaRPr lang="en-US" dirty="0"/>
+          </a:p>
+        </p:txBody>
+      </p:sp>
+      <p:sp>
+        <p:nvSpPr>
+          <p:cNvPr id="3" name="Content Placeholder 2"/>
+          <p:cNvSpPr>
+            <a:spLocks noGrp="1"/>
+          </p:cNvSpPr>
+          <p:nvPr>
+            <p:ph idx="1"/>
+          </p:nvPr>
+        </p:nvSpPr>
+        <p:spPr/>
+        <p:txBody>
+          <a:bodyPr>
+            <a:normAutofit/>
+          </a:bodyPr>
+          <a:lstStyle/>
+          <a:p>
+            <a:r>
+              <a:rPr lang="en-US" sz="1600" dirty="0">
+                <a:hlinkClick r:id="rId2"/>
+              </a:rPr>
+              <a:t>https://</a:t>
+            </a:r>
+            <a:r>
+              <a:rPr lang="en-US" sz="1600" dirty="0" smtClean="0">
+                <a:hlinkClick r:id="rId2"/>
+              </a:rPr>
+              <a:t>www.linkedin.com/pulse/scala-question-2016-mark-makary?trk=pulse_spock-articles</a:t>
+            </a:r>
+            <a:endParaRPr lang="en-US" sz="1600" dirty="0" smtClean="0"/>
+          </a:p>
+          <a:p>
+            <a:r>
+              <a:rPr lang="en-US" sz="1600" dirty="0">
+                <a:hlinkClick r:id="rId3"/>
+              </a:rPr>
+              <a:t>http://spark.apache.org</a:t>
+            </a:r>
+            <a:r>
+              <a:rPr lang="en-US" sz="1600" dirty="0" smtClean="0">
+                <a:hlinkClick r:id="rId3"/>
+              </a:rPr>
+              <a:t>/</a:t>
+            </a:r>
+            <a:endParaRPr lang="en-US" sz="1600" dirty="0" smtClean="0"/>
+          </a:p>
+          <a:p>
+            <a:r>
+              <a:rPr lang="en-US" sz="1600" dirty="0">
+                <a:hlinkClick r:id="rId4"/>
+              </a:rPr>
+              <a:t>https://</a:t>
+            </a:r>
+            <a:r>
+              <a:rPr lang="en-US" sz="1600" dirty="0" smtClean="0">
+                <a:hlinkClick r:id="rId4"/>
+              </a:rPr>
+              <a:t>en.wikipedia.org/wiki/Apache_Spark</a:t>
+            </a:r>
+            <a:endParaRPr lang="en-US" sz="1600" dirty="0" smtClean="0"/>
+          </a:p>
+          <a:p>
+            <a:r>
+              <a:rPr lang="en-US" sz="1600" dirty="0">
+                <a:hlinkClick r:id="rId5"/>
+              </a:rPr>
+              <a:t>https://</a:t>
+            </a:r>
+            <a:r>
+              <a:rPr lang="en-US" sz="1600" dirty="0" smtClean="0">
+                <a:hlinkClick r:id="rId5"/>
+              </a:rPr>
+              <a:t>github.com/apache/spark</a:t>
+            </a:r>
+            <a:endParaRPr lang="en-US" sz="1600" dirty="0" smtClean="0"/>
+          </a:p>
+          <a:p>
+            <a:r>
+              <a:rPr lang="en-US" sz="1600" dirty="0">
+                <a:hlinkClick r:id="rId6"/>
+              </a:rPr>
+              <a:t>http://</a:t>
+            </a:r>
+            <a:r>
+              <a:rPr lang="en-US" sz="1600" dirty="0" smtClean="0">
+                <a:hlinkClick r:id="rId6"/>
+              </a:rPr>
+              <a:t>www.infoq.com/articles/apache-spark-introduction</a:t>
+            </a:r>
+            <a:endParaRPr lang="en-US" sz="1600" dirty="0" smtClean="0"/>
+          </a:p>
+          <a:p>
+            <a:r>
+              <a:rPr lang="en-US" sz="1600" dirty="0">
+                <a:hlinkClick r:id="rId7"/>
+              </a:rPr>
+              <a:t>http://bigdatauniversity.com</a:t>
+            </a:r>
+            <a:r>
+              <a:rPr lang="en-US" sz="1600" dirty="0" smtClean="0">
+                <a:hlinkClick r:id="rId7"/>
+              </a:rPr>
+              <a:t>/</a:t>
+            </a:r>
+            <a:endParaRPr lang="en-US" sz="1600" dirty="0" smtClean="0"/>
+          </a:p>
+          <a:p>
+            <a:r>
+              <a:rPr lang="en-US" sz="1600" dirty="0">
+                <a:hlinkClick r:id="rId8"/>
+              </a:rPr>
+              <a:t>http://www.forbes.com/sites/bernardmarr/2015/06/22/spark-or-hadoop-which-is-the-best-big-data-framework/#</a:t>
+            </a:r>
+            <a:r>
+              <a:rPr lang="en-US" sz="1600" dirty="0" smtClean="0">
+                <a:hlinkClick r:id="rId8"/>
+              </a:rPr>
+              <a:t>19a11e0f532c</a:t>
+            </a:r>
+            <a:endParaRPr lang="en-US" sz="1600" dirty="0" smtClean="0"/>
+          </a:p>
+          <a:p>
+            <a:r>
+              <a:rPr lang="en-US" sz="1600" dirty="0">
+                <a:hlinkClick r:id="rId9"/>
+              </a:rPr>
+              <a:t>http://bigdata.andreamostosi.name</a:t>
+            </a:r>
+            <a:r>
+              <a:rPr lang="en-US" sz="1600" dirty="0" smtClean="0">
+                <a:hlinkClick r:id="rId9"/>
+              </a:rPr>
+              <a:t>/</a:t>
+            </a:r>
+            <a:endParaRPr lang="en-US" sz="1600" dirty="0" smtClean="0"/>
+          </a:p>
+          <a:p>
+            <a:r>
+              <a:rPr lang="en-US" sz="1600" dirty="0">
+                <a:hlinkClick r:id="rId9"/>
+              </a:rPr>
+              <a:t>http://bigdata.andreamostosi.name</a:t>
+            </a:r>
+            <a:r>
+              <a:rPr lang="en-US" sz="1600" dirty="0" smtClean="0">
+                <a:hlinkClick r:id="rId9"/>
+              </a:rPr>
+              <a:t>/</a:t>
+            </a:r>
+            <a:endParaRPr lang="en-US" sz="1600" dirty="0" smtClean="0"/>
+          </a:p>
+          <a:p>
+            <a:r>
+              <a:rPr lang="en-US" sz="1600" dirty="0">
+                <a:hlinkClick r:id="rId10"/>
+              </a:rPr>
+              <a:t>https://</a:t>
+            </a:r>
+            <a:r>
+              <a:rPr lang="en-US" sz="1600" dirty="0" smtClean="0">
+                <a:hlinkClick r:id="rId10"/>
+              </a:rPr>
+              <a:t>github.com/alexandru/scala-best-practices/blob/master/sections/2-language-rules.md</a:t>
+            </a:r>
+            <a:endParaRPr lang="en-US" sz="1600" dirty="0" smtClean="0"/>
+          </a:p>
+          <a:p>
+            <a:r>
+              <a:rPr lang="en-US" sz="1600" dirty="0">
+                <a:hlinkClick r:id="rId11"/>
+              </a:rPr>
+              <a:t>http://www.alternatestack.com/development/mixin-class-compositions-in-scala</a:t>
+            </a:r>
+            <a:r>
+              <a:rPr lang="en-US" sz="1600" dirty="0" smtClean="0">
+                <a:hlinkClick r:id="rId11"/>
+              </a:rPr>
+              <a:t>/</a:t>
+            </a:r>
+            <a:endParaRPr lang="en-US" sz="1600" dirty="0" smtClean="0"/>
+          </a:p>
+          <a:p>
+            <a:r>
+              <a:rPr lang="en-US" sz="1600" dirty="0"/>
+              <a:t>https://intellipaat.com/interview-question/apache-spark-interview-questions/?utm_source=spark%20interview%20linkedin_SM&amp;utm_medium=posting&amp;utm_campaign=spark%20interview%20linkedin_SM%2Fposting</a:t>
+            </a:r>
+            <a:endParaRPr lang="en-US" sz="1600" dirty="0" smtClean="0"/>
+          </a:p>
+          <a:p>
+            <a:endParaRPr lang="en-US" sz="1600" dirty="0" smtClean="0"/>
+          </a:p>
+        </p:txBody>
+      </p:sp>
+    </p:spTree>
+    <p:extLst>
+      <p:ext uri="{BB962C8B-B14F-4D97-AF65-F5344CB8AC3E}">
+        <p14:creationId xmlns:p14="http://schemas.microsoft.com/office/powerpoint/2010/main" val="924403351"/>
+      </p:ext>
+    </p:extLst>
+  </p:cSld>
+  <p:clrMapOvr>
+    <a:masterClrMapping/>
+  </p:clrMapOvr>
+  <p:timing>
+    <p:tnLst>
+      <p:par>
+        <p:cTn id="1" dur="indefinite" restart="never" nodeType="tmRoot"/>
+      </p:par>
+    </p:tnLst>
+  </p:timing>
+</p:sld>
+</file>
+
+<file path=ppt/slides/slide31.xml><?xml version="1.0" encoding="utf-8"?>
 <p:sld xmlns:a="http://schemas.openxmlformats.org/drawingml/2006/main" xmlns:r="http://schemas.openxmlformats.org/officeDocument/2006/relationships" xmlns:p="http://schemas.openxmlformats.org/presentationml/2006/main">
   <p:cSld>
     <p:spTree>

</xml_diff>